<commit_message>
Part 1 names, email and code fully implemented
</commit_message>
<xml_diff>
--- a/Description/JazzGuestsUpload.pptx
+++ b/Description/JazzGuestsUpload.pptx
@@ -264,7 +264,7 @@
           <a:p>
             <a:fld id="{DDCE6D58-9B57-4731-A47B-3CD41B48F0A9}" type="datetimeFigureOut">
               <a:rPr lang="de-CH" smtClean="0"/>
-              <a:t>05.01.2024</a:t>
+              <a:t>09.01.2024</a:t>
             </a:fld>
             <a:endParaRPr lang="de-CH"/>
           </a:p>
@@ -434,7 +434,7 @@
           <a:p>
             <a:fld id="{DDCE6D58-9B57-4731-A47B-3CD41B48F0A9}" type="datetimeFigureOut">
               <a:rPr lang="de-CH" smtClean="0"/>
-              <a:t>05.01.2024</a:t>
+              <a:t>09.01.2024</a:t>
             </a:fld>
             <a:endParaRPr lang="de-CH"/>
           </a:p>
@@ -614,7 +614,7 @@
           <a:p>
             <a:fld id="{DDCE6D58-9B57-4731-A47B-3CD41B48F0A9}" type="datetimeFigureOut">
               <a:rPr lang="de-CH" smtClean="0"/>
-              <a:t>05.01.2024</a:t>
+              <a:t>09.01.2024</a:t>
             </a:fld>
             <a:endParaRPr lang="de-CH"/>
           </a:p>
@@ -784,7 +784,7 @@
           <a:p>
             <a:fld id="{DDCE6D58-9B57-4731-A47B-3CD41B48F0A9}" type="datetimeFigureOut">
               <a:rPr lang="de-CH" smtClean="0"/>
-              <a:t>05.01.2024</a:t>
+              <a:t>09.01.2024</a:t>
             </a:fld>
             <a:endParaRPr lang="de-CH"/>
           </a:p>
@@ -1030,7 +1030,7 @@
           <a:p>
             <a:fld id="{DDCE6D58-9B57-4731-A47B-3CD41B48F0A9}" type="datetimeFigureOut">
               <a:rPr lang="de-CH" smtClean="0"/>
-              <a:t>05.01.2024</a:t>
+              <a:t>09.01.2024</a:t>
             </a:fld>
             <a:endParaRPr lang="de-CH"/>
           </a:p>
@@ -1262,7 +1262,7 @@
           <a:p>
             <a:fld id="{DDCE6D58-9B57-4731-A47B-3CD41B48F0A9}" type="datetimeFigureOut">
               <a:rPr lang="de-CH" smtClean="0"/>
-              <a:t>05.01.2024</a:t>
+              <a:t>09.01.2024</a:t>
             </a:fld>
             <a:endParaRPr lang="de-CH"/>
           </a:p>
@@ -1629,7 +1629,7 @@
           <a:p>
             <a:fld id="{DDCE6D58-9B57-4731-A47B-3CD41B48F0A9}" type="datetimeFigureOut">
               <a:rPr lang="de-CH" smtClean="0"/>
-              <a:t>05.01.2024</a:t>
+              <a:t>09.01.2024</a:t>
             </a:fld>
             <a:endParaRPr lang="de-CH"/>
           </a:p>
@@ -1747,7 +1747,7 @@
           <a:p>
             <a:fld id="{DDCE6D58-9B57-4731-A47B-3CD41B48F0A9}" type="datetimeFigureOut">
               <a:rPr lang="de-CH" smtClean="0"/>
-              <a:t>05.01.2024</a:t>
+              <a:t>09.01.2024</a:t>
             </a:fld>
             <a:endParaRPr lang="de-CH"/>
           </a:p>
@@ -1842,7 +1842,7 @@
           <a:p>
             <a:fld id="{DDCE6D58-9B57-4731-A47B-3CD41B48F0A9}" type="datetimeFigureOut">
               <a:rPr lang="de-CH" smtClean="0"/>
-              <a:t>05.01.2024</a:t>
+              <a:t>09.01.2024</a:t>
             </a:fld>
             <a:endParaRPr lang="de-CH"/>
           </a:p>
@@ -2119,7 +2119,7 @@
           <a:p>
             <a:fld id="{DDCE6D58-9B57-4731-A47B-3CD41B48F0A9}" type="datetimeFigureOut">
               <a:rPr lang="de-CH" smtClean="0"/>
-              <a:t>05.01.2024</a:t>
+              <a:t>09.01.2024</a:t>
             </a:fld>
             <a:endParaRPr lang="de-CH"/>
           </a:p>
@@ -2372,7 +2372,7 @@
           <a:p>
             <a:fld id="{DDCE6D58-9B57-4731-A47B-3CD41B48F0A9}" type="datetimeFigureOut">
               <a:rPr lang="de-CH" smtClean="0"/>
-              <a:t>05.01.2024</a:t>
+              <a:t>09.01.2024</a:t>
             </a:fld>
             <a:endParaRPr lang="de-CH"/>
           </a:p>
@@ -2585,7 +2585,7 @@
           <a:p>
             <a:fld id="{DDCE6D58-9B57-4731-A47B-3CD41B48F0A9}" type="datetimeFigureOut">
               <a:rPr lang="de-CH" smtClean="0"/>
-              <a:t>05.01.2024</a:t>
+              <a:t>09.01.2024</a:t>
             </a:fld>
             <a:endParaRPr lang="de-CH"/>
           </a:p>
@@ -3019,7 +3019,7 @@
         </p:blipFill>
         <p:spPr bwMode="auto">
           <a:xfrm>
-            <a:off x="2627595" y="616633"/>
+            <a:off x="2604435" y="552938"/>
             <a:ext cx="766129" cy="766129"/>
           </a:xfrm>
           <a:prstGeom prst="rect">
@@ -3066,7 +3066,7 @@
         </p:blipFill>
         <p:spPr bwMode="auto">
           <a:xfrm>
-            <a:off x="2870048" y="1336632"/>
+            <a:off x="2783974" y="1611531"/>
             <a:ext cx="1812174" cy="1812174"/>
           </a:xfrm>
           <a:prstGeom prst="rect">
@@ -3113,7 +3113,7 @@
         </p:blipFill>
         <p:spPr bwMode="auto">
           <a:xfrm>
-            <a:off x="3575453" y="499174"/>
+            <a:off x="3770566" y="491708"/>
             <a:ext cx="1582177" cy="883588"/>
           </a:xfrm>
           <a:prstGeom prst="rect">
@@ -3153,7 +3153,7 @@
         </p:blipFill>
         <p:spPr>
           <a:xfrm>
-            <a:off x="5454623" y="1480886"/>
+            <a:off x="5713488" y="1477368"/>
             <a:ext cx="2724471" cy="1040144"/>
           </a:xfrm>
           <a:prstGeom prst="rect">
@@ -3679,7 +3679,7 @@
         </p:nvSpPr>
         <p:spPr>
           <a:xfrm>
-            <a:off x="2468042" y="296737"/>
+            <a:off x="2420229" y="213339"/>
             <a:ext cx="1085233" cy="307777"/>
           </a:xfrm>
           <a:prstGeom prst="rect">
@@ -3717,7 +3717,7 @@
         </p:nvSpPr>
         <p:spPr>
           <a:xfrm>
-            <a:off x="3776135" y="250487"/>
+            <a:off x="3975772" y="222246"/>
             <a:ext cx="1372560" cy="307777"/>
           </a:xfrm>
           <a:prstGeom prst="rect">
@@ -3736,7 +3736,7 @@
                 <a:latin typeface="Arial" panose="020B0604020202020204" pitchFamily="34" charset="0"/>
                 <a:cs typeface="Arial" panose="020B0604020202020204" pitchFamily="34" charset="0"/>
               </a:rPr>
-              <a:t>Kamerabild</a:t>
+              <a:t>Kamerakopie</a:t>
             </a:r>
           </a:p>
         </p:txBody>
@@ -3755,8 +3755,8 @@
         </p:nvSpPr>
         <p:spPr>
           <a:xfrm>
-            <a:off x="3342756" y="1555205"/>
-            <a:ext cx="1372560" cy="307777"/>
+            <a:off x="3376241" y="1773671"/>
+            <a:ext cx="889879" cy="307777"/>
           </a:xfrm>
           <a:prstGeom prst="rect">
             <a:avLst/>
@@ -3793,7 +3793,7 @@
         </p:nvSpPr>
         <p:spPr>
           <a:xfrm>
-            <a:off x="5515967" y="1070622"/>
+            <a:off x="5818507" y="1067519"/>
             <a:ext cx="1372560" cy="307777"/>
           </a:xfrm>
           <a:prstGeom prst="rect">
@@ -3907,7 +3907,7 @@
         </p:nvSpPr>
         <p:spPr>
           <a:xfrm>
-            <a:off x="3472962" y="2475865"/>
+            <a:off x="3279060" y="3244800"/>
             <a:ext cx="556074" cy="646331"/>
           </a:xfrm>
           <a:prstGeom prst="rect">
@@ -4041,6 +4041,88 @@
                 <a:cs typeface="Arial" panose="020B0604020202020204" pitchFamily="34" charset="0"/>
               </a:rPr>
               <a:t>4</a:t>
+            </a:r>
+          </a:p>
+        </p:txBody>
+      </p:sp>
+      <p:sp>
+        <p:nvSpPr>
+          <p:cNvPr id="2" name="Textfeld 1">
+            <a:extLst>
+              <a:ext uri="{FF2B5EF4-FFF2-40B4-BE49-F238E27FC236}">
+                <a16:creationId xmlns:a16="http://schemas.microsoft.com/office/drawing/2014/main" id="{F9DC1F21-6F5A-C914-23A9-53DD0B48E602}"/>
+              </a:ext>
+            </a:extLst>
+          </p:cNvPr>
+          <p:cNvSpPr txBox="1"/>
+          <p:nvPr/>
+        </p:nvSpPr>
+        <p:spPr>
+          <a:xfrm>
+            <a:off x="3441622" y="607266"/>
+            <a:ext cx="441010" cy="646331"/>
+          </a:xfrm>
+          <a:prstGeom prst="rect">
+            <a:avLst/>
+          </a:prstGeom>
+          <a:noFill/>
+        </p:spPr>
+        <p:txBody>
+          <a:bodyPr wrap="square" rtlCol="0">
+            <a:spAutoFit/>
+          </a:bodyPr>
+          <a:lstStyle/>
+          <a:p>
+            <a:r>
+              <a:rPr lang="de-CH" sz="3600" b="1" dirty="0">
+                <a:solidFill>
+                  <a:srgbClr val="FF0000"/>
+                </a:solidFill>
+                <a:latin typeface="Arial" panose="020B0604020202020204" pitchFamily="34" charset="0"/>
+                <a:cs typeface="Arial" panose="020B0604020202020204" pitchFamily="34" charset="0"/>
+              </a:rPr>
+              <a:t>+</a:t>
+            </a:r>
+          </a:p>
+        </p:txBody>
+      </p:sp>
+      <p:sp>
+        <p:nvSpPr>
+          <p:cNvPr id="3" name="Textfeld 2">
+            <a:extLst>
+              <a:ext uri="{FF2B5EF4-FFF2-40B4-BE49-F238E27FC236}">
+                <a16:creationId xmlns:a16="http://schemas.microsoft.com/office/drawing/2014/main" id="{11C6EAF5-8A1A-3F21-82FC-0BDDE0401B06}"/>
+              </a:ext>
+            </a:extLst>
+          </p:cNvPr>
+          <p:cNvSpPr txBox="1"/>
+          <p:nvPr/>
+        </p:nvSpPr>
+        <p:spPr>
+          <a:xfrm>
+            <a:off x="3255705" y="1274594"/>
+            <a:ext cx="1372560" cy="523220"/>
+          </a:xfrm>
+          <a:prstGeom prst="rect">
+            <a:avLst/>
+          </a:prstGeom>
+          <a:noFill/>
+        </p:spPr>
+        <p:txBody>
+          <a:bodyPr wrap="square" rtlCol="0">
+            <a:spAutoFit/>
+          </a:bodyPr>
+          <a:lstStyle/>
+          <a:p>
+            <a:r>
+              <a:rPr lang="de-CH" sz="2800" b="1" i="1" dirty="0">
+                <a:solidFill>
+                  <a:srgbClr val="FF0000"/>
+                </a:solidFill>
+                <a:latin typeface="Arial" panose="020B0604020202020204" pitchFamily="34" charset="0"/>
+                <a:cs typeface="Arial" panose="020B0604020202020204" pitchFamily="34" charset="0"/>
+              </a:rPr>
+              <a:t>oder</a:t>
             </a:r>
           </a:p>
         </p:txBody>

</xml_diff>

<commit_message>
Local storage for names and email
</commit_message>
<xml_diff>
--- a/Description/JazzGuestsUpload.pptx
+++ b/Description/JazzGuestsUpload.pptx
@@ -7267,8 +7267,8 @@
         </p:nvSpPr>
         <p:spPr>
           <a:xfrm>
-            <a:off x="2572356" y="4229757"/>
-            <a:ext cx="735983" cy="292247"/>
+            <a:off x="203357" y="3344171"/>
+            <a:ext cx="3166948" cy="292247"/>
           </a:xfrm>
           <a:prstGeom prst="rect">
             <a:avLst/>
@@ -7309,7 +7309,7 @@
                 <a:latin typeface="Arial" panose="020B0604020202020204" pitchFamily="34" charset="0"/>
                 <a:cs typeface="Arial" panose="020B0604020202020204" pitchFamily="34" charset="0"/>
               </a:rPr>
-              <a:t>Senden</a:t>
+              <a:t>Weiter</a:t>
             </a:r>
           </a:p>
         </p:txBody>
@@ -7436,6 +7436,36 @@
           </a:p>
         </p:txBody>
       </p:sp>
+      <p:pic>
+        <p:nvPicPr>
+          <p:cNvPr id="31" name="Grafik 30">
+            <a:extLst>
+              <a:ext uri="{FF2B5EF4-FFF2-40B4-BE49-F238E27FC236}">
+                <a16:creationId xmlns:a16="http://schemas.microsoft.com/office/drawing/2014/main" id="{0DFB1128-83C3-1FD0-1537-3645051ED72C}"/>
+              </a:ext>
+            </a:extLst>
+          </p:cNvPr>
+          <p:cNvPicPr>
+            <a:picLocks noChangeAspect="1"/>
+          </p:cNvPicPr>
+          <p:nvPr/>
+        </p:nvPicPr>
+        <p:blipFill>
+          <a:blip r:embed="rId6"/>
+          <a:stretch>
+            <a:fillRect/>
+          </a:stretch>
+        </p:blipFill>
+        <p:spPr>
+          <a:xfrm>
+            <a:off x="1226418" y="3733949"/>
+            <a:ext cx="899396" cy="855192"/>
+          </a:xfrm>
+          <a:prstGeom prst="rect">
+            <a:avLst/>
+          </a:prstGeom>
+        </p:spPr>
+      </p:pic>
     </p:spTree>
     <p:extLst>
       <p:ext uri="{BB962C8B-B14F-4D97-AF65-F5344CB8AC3E}">
@@ -7876,11 +7906,19 @@
           <a:p>
             <a:r>
               <a:rPr lang="de-CH" sz="1100" b="1" dirty="0" err="1"/>
-              <a:t>id_div_upload_image</a:t>
+              <a:t>id_div</a:t>
             </a:r>
             <a:r>
               <a:rPr lang="de-CH" sz="1100" b="1" dirty="0"/>
-              <a:t>  </a:t>
+              <a:t>_ </a:t>
+            </a:r>
+            <a:r>
+              <a:rPr lang="de-CH" sz="1100" b="1" dirty="0" err="1"/>
+              <a:t>upload_container_part_two</a:t>
+            </a:r>
+            <a:r>
+              <a:rPr lang="de-CH" sz="1100" b="1" dirty="0"/>
+              <a:t> </a:t>
             </a:r>
             <a:r>
               <a:rPr lang="de-CH" sz="1100" b="1" dirty="0" err="1"/>
@@ -8741,7 +8779,7 @@
         <p:spPr>
           <a:xfrm>
             <a:off x="3288338" y="424696"/>
-            <a:ext cx="6270441" cy="1316905"/>
+            <a:ext cx="6270441" cy="3628830"/>
           </a:xfrm>
           <a:prstGeom prst="rect">
             <a:avLst/>
@@ -8793,6 +8831,110 @@
         <p:spPr>
           <a:xfrm>
             <a:off x="3284240" y="381585"/>
+            <a:ext cx="4333461" cy="261610"/>
+          </a:xfrm>
+          <a:prstGeom prst="rect">
+            <a:avLst/>
+          </a:prstGeom>
+          <a:noFill/>
+        </p:spPr>
+        <p:txBody>
+          <a:bodyPr wrap="square" rtlCol="0">
+            <a:spAutoFit/>
+          </a:bodyPr>
+          <a:lstStyle/>
+          <a:p>
+            <a:r>
+              <a:rPr lang="de-CH" sz="1100" b="1" dirty="0" err="1"/>
+              <a:t>id_div_upload_container_part_two</a:t>
+            </a:r>
+            <a:r>
+              <a:rPr lang="de-CH" sz="1100" b="1" dirty="0"/>
+              <a:t>  </a:t>
+            </a:r>
+            <a:r>
+              <a:rPr lang="de-CH" sz="1100" b="1" dirty="0" err="1"/>
+              <a:t>clear</a:t>
+            </a:r>
+            <a:r>
+              <a:rPr lang="de-CH" sz="1100" b="1" dirty="0"/>
+              <a:t> </a:t>
+            </a:r>
+            <a:r>
+              <a:rPr lang="de-CH" sz="1100" b="1" dirty="0" err="1"/>
+              <a:t>both</a:t>
+            </a:r>
+            <a:endParaRPr lang="de-CH" b="1" dirty="0"/>
+          </a:p>
+        </p:txBody>
+      </p:sp>
+      <p:sp>
+        <p:nvSpPr>
+          <p:cNvPr id="4" name="Rechteck 3">
+            <a:extLst>
+              <a:ext uri="{FF2B5EF4-FFF2-40B4-BE49-F238E27FC236}">
+                <a16:creationId xmlns:a16="http://schemas.microsoft.com/office/drawing/2014/main" id="{EA390380-79EC-61A2-A911-26C338F61D97}"/>
+              </a:ext>
+            </a:extLst>
+          </p:cNvPr>
+          <p:cNvSpPr/>
+          <p:nvPr/>
+        </p:nvSpPr>
+        <p:spPr>
+          <a:xfrm>
+            <a:off x="3373179" y="643194"/>
+            <a:ext cx="6053625" cy="2873003"/>
+          </a:xfrm>
+          <a:prstGeom prst="rect">
+            <a:avLst/>
+          </a:prstGeom>
+          <a:noFill/>
+          <a:ln w="19050">
+            <a:solidFill>
+              <a:schemeClr val="tx1"/>
+            </a:solidFill>
+          </a:ln>
+        </p:spPr>
+        <p:style>
+          <a:lnRef idx="2">
+            <a:schemeClr val="accent1">
+              <a:shade val="50000"/>
+            </a:schemeClr>
+          </a:lnRef>
+          <a:fillRef idx="1">
+            <a:schemeClr val="accent1"/>
+          </a:fillRef>
+          <a:effectRef idx="0">
+            <a:schemeClr val="accent1"/>
+          </a:effectRef>
+          <a:fontRef idx="minor">
+            <a:schemeClr val="lt1"/>
+          </a:fontRef>
+        </p:style>
+        <p:txBody>
+          <a:bodyPr rtlCol="0" anchor="ctr"/>
+          <a:lstStyle/>
+          <a:p>
+            <a:pPr algn="ctr"/>
+            <a:endParaRPr lang="de-CH" dirty="0"/>
+          </a:p>
+        </p:txBody>
+      </p:sp>
+      <p:sp>
+        <p:nvSpPr>
+          <p:cNvPr id="5" name="Textfeld 4">
+            <a:extLst>
+              <a:ext uri="{FF2B5EF4-FFF2-40B4-BE49-F238E27FC236}">
+                <a16:creationId xmlns:a16="http://schemas.microsoft.com/office/drawing/2014/main" id="{7E883965-7BB7-0CF8-E8A3-88A1678985B5}"/>
+              </a:ext>
+            </a:extLst>
+          </p:cNvPr>
+          <p:cNvSpPr txBox="1"/>
+          <p:nvPr/>
+        </p:nvSpPr>
+        <p:spPr>
+          <a:xfrm>
+            <a:off x="3373179" y="673646"/>
             <a:ext cx="4333461" cy="261610"/>
           </a:xfrm>
           <a:prstGeom prst="rect">

</xml_diff>

<commit_message>
Buttons back and forward implemented
</commit_message>
<xml_diff>
--- a/Description/JazzGuestsUpload.pptx
+++ b/Description/JazzGuestsUpload.pptx
@@ -264,7 +264,7 @@
           <a:p>
             <a:fld id="{DDCE6D58-9B57-4731-A47B-3CD41B48F0A9}" type="datetimeFigureOut">
               <a:rPr lang="de-CH" smtClean="0"/>
-              <a:t>09.01.2024</a:t>
+              <a:t>10.01.2024</a:t>
             </a:fld>
             <a:endParaRPr lang="de-CH"/>
           </a:p>
@@ -434,7 +434,7 @@
           <a:p>
             <a:fld id="{DDCE6D58-9B57-4731-A47B-3CD41B48F0A9}" type="datetimeFigureOut">
               <a:rPr lang="de-CH" smtClean="0"/>
-              <a:t>09.01.2024</a:t>
+              <a:t>10.01.2024</a:t>
             </a:fld>
             <a:endParaRPr lang="de-CH"/>
           </a:p>
@@ -614,7 +614,7 @@
           <a:p>
             <a:fld id="{DDCE6D58-9B57-4731-A47B-3CD41B48F0A9}" type="datetimeFigureOut">
               <a:rPr lang="de-CH" smtClean="0"/>
-              <a:t>09.01.2024</a:t>
+              <a:t>10.01.2024</a:t>
             </a:fld>
             <a:endParaRPr lang="de-CH"/>
           </a:p>
@@ -784,7 +784,7 @@
           <a:p>
             <a:fld id="{DDCE6D58-9B57-4731-A47B-3CD41B48F0A9}" type="datetimeFigureOut">
               <a:rPr lang="de-CH" smtClean="0"/>
-              <a:t>09.01.2024</a:t>
+              <a:t>10.01.2024</a:t>
             </a:fld>
             <a:endParaRPr lang="de-CH"/>
           </a:p>
@@ -1030,7 +1030,7 @@
           <a:p>
             <a:fld id="{DDCE6D58-9B57-4731-A47B-3CD41B48F0A9}" type="datetimeFigureOut">
               <a:rPr lang="de-CH" smtClean="0"/>
-              <a:t>09.01.2024</a:t>
+              <a:t>10.01.2024</a:t>
             </a:fld>
             <a:endParaRPr lang="de-CH"/>
           </a:p>
@@ -1262,7 +1262,7 @@
           <a:p>
             <a:fld id="{DDCE6D58-9B57-4731-A47B-3CD41B48F0A9}" type="datetimeFigureOut">
               <a:rPr lang="de-CH" smtClean="0"/>
-              <a:t>09.01.2024</a:t>
+              <a:t>10.01.2024</a:t>
             </a:fld>
             <a:endParaRPr lang="de-CH"/>
           </a:p>
@@ -1629,7 +1629,7 @@
           <a:p>
             <a:fld id="{DDCE6D58-9B57-4731-A47B-3CD41B48F0A9}" type="datetimeFigureOut">
               <a:rPr lang="de-CH" smtClean="0"/>
-              <a:t>09.01.2024</a:t>
+              <a:t>10.01.2024</a:t>
             </a:fld>
             <a:endParaRPr lang="de-CH"/>
           </a:p>
@@ -1747,7 +1747,7 @@
           <a:p>
             <a:fld id="{DDCE6D58-9B57-4731-A47B-3CD41B48F0A9}" type="datetimeFigureOut">
               <a:rPr lang="de-CH" smtClean="0"/>
-              <a:t>09.01.2024</a:t>
+              <a:t>10.01.2024</a:t>
             </a:fld>
             <a:endParaRPr lang="de-CH"/>
           </a:p>
@@ -1842,7 +1842,7 @@
           <a:p>
             <a:fld id="{DDCE6D58-9B57-4731-A47B-3CD41B48F0A9}" type="datetimeFigureOut">
               <a:rPr lang="de-CH" smtClean="0"/>
-              <a:t>09.01.2024</a:t>
+              <a:t>10.01.2024</a:t>
             </a:fld>
             <a:endParaRPr lang="de-CH"/>
           </a:p>
@@ -2119,7 +2119,7 @@
           <a:p>
             <a:fld id="{DDCE6D58-9B57-4731-A47B-3CD41B48F0A9}" type="datetimeFigureOut">
               <a:rPr lang="de-CH" smtClean="0"/>
-              <a:t>09.01.2024</a:t>
+              <a:t>10.01.2024</a:t>
             </a:fld>
             <a:endParaRPr lang="de-CH"/>
           </a:p>
@@ -2372,7 +2372,7 @@
           <a:p>
             <a:fld id="{DDCE6D58-9B57-4731-A47B-3CD41B48F0A9}" type="datetimeFigureOut">
               <a:rPr lang="de-CH" smtClean="0"/>
-              <a:t>09.01.2024</a:t>
+              <a:t>10.01.2024</a:t>
             </a:fld>
             <a:endParaRPr lang="de-CH"/>
           </a:p>
@@ -2585,7 +2585,7 @@
           <a:p>
             <a:fld id="{DDCE6D58-9B57-4731-A47B-3CD41B48F0A9}" type="datetimeFigureOut">
               <a:rPr lang="de-CH" smtClean="0"/>
-              <a:t>09.01.2024</a:t>
+              <a:t>10.01.2024</a:t>
             </a:fld>
             <a:endParaRPr lang="de-CH"/>
           </a:p>
@@ -9641,11 +9641,15 @@
           <a:p>
             <a:r>
               <a:rPr lang="de-CH" sz="1100" b="1" dirty="0" err="1"/>
-              <a:t>id_div_upload_button_back_forward</a:t>
-            </a:r>
-            <a:r>
-              <a:rPr lang="de-CH" sz="1100" b="1" dirty="0"/>
-              <a:t>  </a:t>
+              <a:t>id_div_upload_button_back_forward_</a:t>
+            </a:r>
+            <a:r>
+              <a:rPr lang="de-CH" sz="1100" b="1" err="1"/>
+              <a:t>part</a:t>
+            </a:r>
+            <a:r>
+              <a:rPr lang="de-CH" sz="1100" b="1"/>
+              <a:t>_two  </a:t>
             </a:r>
             <a:r>
               <a:rPr lang="de-CH" sz="1100" b="1" dirty="0" err="1"/>

</xml_diff>

<commit_message>
Image uploaded to server
</commit_message>
<xml_diff>
--- a/Description/JazzGuestsUpload.pptx
+++ b/Description/JazzGuestsUpload.pptx
@@ -8883,7 +8883,7 @@
         <p:spPr>
           <a:xfrm>
             <a:off x="2901839" y="812877"/>
-            <a:ext cx="6053625" cy="2873003"/>
+            <a:ext cx="6053625" cy="3358837"/>
           </a:xfrm>
           <a:prstGeom prst="rect">
             <a:avLst/>
@@ -8935,7 +8935,7 @@
         <p:spPr>
           <a:xfrm>
             <a:off x="2901839" y="843329"/>
-            <a:ext cx="4333461" cy="261610"/>
+            <a:ext cx="5131324" cy="261610"/>
           </a:xfrm>
           <a:prstGeom prst="rect">
             <a:avLst/>
@@ -8968,6 +8968,22 @@
               <a:rPr lang="de-CH" sz="1100" b="1" dirty="0" err="1"/>
               <a:t>both</a:t>
             </a:r>
+            <a:r>
+              <a:rPr lang="de-CH" sz="1100" b="1" dirty="0"/>
+              <a:t>  Container </a:t>
+            </a:r>
+            <a:r>
+              <a:rPr lang="de-CH" sz="1100" b="1" dirty="0" err="1"/>
+              <a:t>for</a:t>
+            </a:r>
+            <a:r>
+              <a:rPr lang="de-CH" sz="1100" b="1" dirty="0"/>
+              <a:t> </a:t>
+            </a:r>
+            <a:r>
+              <a:rPr lang="de-CH" sz="1100" b="1" dirty="0" err="1"/>
+              <a:t>JazzUploadImage</a:t>
+            </a:r>
             <a:endParaRPr lang="de-CH" b="1" dirty="0"/>
           </a:p>
         </p:txBody>
@@ -8986,7 +9002,7 @@
         </p:nvSpPr>
         <p:spPr>
           <a:xfrm>
-            <a:off x="6162960" y="1564617"/>
+            <a:off x="6162960" y="2148646"/>
             <a:ext cx="1667596" cy="160628"/>
           </a:xfrm>
           <a:prstGeom prst="rect">
@@ -9048,7 +9064,7 @@
         </p:nvSpPr>
         <p:spPr>
           <a:xfrm>
-            <a:off x="6637472" y="1193430"/>
+            <a:off x="9333537" y="1193430"/>
             <a:ext cx="1017778" cy="237002"/>
           </a:xfrm>
           <a:prstGeom prst="rect">
@@ -9117,7 +9133,7 @@
         </p:blipFill>
         <p:spPr>
           <a:xfrm>
-            <a:off x="4931828" y="2191020"/>
+            <a:off x="4931828" y="2822619"/>
             <a:ext cx="1193813" cy="1033191"/>
           </a:xfrm>
           <a:prstGeom prst="rect">
@@ -9261,8 +9277,8 @@
         </p:nvSpPr>
         <p:spPr>
           <a:xfrm>
-            <a:off x="2963073" y="1148050"/>
-            <a:ext cx="5731496" cy="289123"/>
+            <a:off x="2963073" y="1148049"/>
+            <a:ext cx="5731496" cy="858665"/>
           </a:xfrm>
           <a:prstGeom prst="rect">
             <a:avLst/>
@@ -9313,8 +9329,8 @@
         </p:nvSpPr>
         <p:spPr>
           <a:xfrm>
-            <a:off x="2963073" y="1148050"/>
-            <a:ext cx="5131324" cy="261610"/>
+            <a:off x="2901838" y="1124779"/>
+            <a:ext cx="2183962" cy="261610"/>
           </a:xfrm>
           <a:prstGeom prst="rect">
             <a:avLst/>
@@ -9331,22 +9347,6 @@
               <a:rPr lang="de-CH" sz="1100" b="1" dirty="0" err="1"/>
               <a:t>id_div_guestbook_fileupload</a:t>
             </a:r>
-            <a:r>
-              <a:rPr lang="de-CH" sz="1100" b="1" dirty="0"/>
-              <a:t> </a:t>
-            </a:r>
-            <a:r>
-              <a:rPr lang="de-CH" sz="1100" b="1" dirty="0" err="1"/>
-              <a:t>clear</a:t>
-            </a:r>
-            <a:r>
-              <a:rPr lang="de-CH" sz="1100" b="1" dirty="0"/>
-              <a:t> </a:t>
-            </a:r>
-            <a:r>
-              <a:rPr lang="de-CH" sz="1100" b="1" dirty="0" err="1"/>
-              <a:t>both</a:t>
-            </a:r>
             <a:endParaRPr lang="de-CH" b="1" dirty="0"/>
           </a:p>
         </p:txBody>
@@ -9365,7 +9365,7 @@
         </p:nvSpPr>
         <p:spPr>
           <a:xfrm>
-            <a:off x="2963073" y="1502679"/>
+            <a:off x="2963073" y="2086708"/>
             <a:ext cx="5731496" cy="289123"/>
           </a:xfrm>
           <a:prstGeom prst="rect">
@@ -9417,7 +9417,7 @@
         </p:nvSpPr>
         <p:spPr>
           <a:xfrm>
-            <a:off x="2963073" y="1502679"/>
+            <a:off x="2963073" y="2086708"/>
             <a:ext cx="5131324" cy="261610"/>
           </a:xfrm>
           <a:prstGeom prst="rect">
@@ -9469,7 +9469,7 @@
         </p:nvSpPr>
         <p:spPr>
           <a:xfrm>
-            <a:off x="2963073" y="1857308"/>
+            <a:off x="2963073" y="2488907"/>
             <a:ext cx="5731496" cy="1569731"/>
           </a:xfrm>
           <a:prstGeom prst="rect">
@@ -9521,7 +9521,7 @@
         </p:nvSpPr>
         <p:spPr>
           <a:xfrm>
-            <a:off x="2963073" y="1833346"/>
+            <a:off x="2963073" y="2464945"/>
             <a:ext cx="5131324" cy="261610"/>
           </a:xfrm>
           <a:prstGeom prst="rect">
@@ -9641,15 +9641,11 @@
           <a:p>
             <a:r>
               <a:rPr lang="de-CH" sz="1100" b="1" dirty="0" err="1"/>
-              <a:t>id_div_upload_button_back_forward_</a:t>
-            </a:r>
-            <a:r>
-              <a:rPr lang="de-CH" sz="1100" b="1" err="1"/>
-              <a:t>part</a:t>
-            </a:r>
-            <a:r>
-              <a:rPr lang="de-CH" sz="1100" b="1"/>
-              <a:t>_two  </a:t>
+              <a:t>id_div_upload_button_back_forward_part_two</a:t>
+            </a:r>
+            <a:r>
+              <a:rPr lang="de-CH" sz="1100" b="1" dirty="0"/>
+              <a:t>  </a:t>
             </a:r>
             <a:r>
               <a:rPr lang="de-CH" sz="1100" b="1" dirty="0" err="1"/>
@@ -9874,6 +9870,102 @@
             <a:r>
               <a:rPr lang="de-CH" sz="1100" b="1" dirty="0" err="1"/>
               <a:t>right</a:t>
+            </a:r>
+            <a:endParaRPr lang="de-CH" b="1" dirty="0"/>
+          </a:p>
+        </p:txBody>
+      </p:sp>
+      <p:sp>
+        <p:nvSpPr>
+          <p:cNvPr id="6" name="Rechteck 5">
+            <a:extLst>
+              <a:ext uri="{FF2B5EF4-FFF2-40B4-BE49-F238E27FC236}">
+                <a16:creationId xmlns:a16="http://schemas.microsoft.com/office/drawing/2014/main" id="{03721909-769B-393D-4D73-648E7CEF1FEB}"/>
+              </a:ext>
+            </a:extLst>
+          </p:cNvPr>
+          <p:cNvSpPr/>
+          <p:nvPr/>
+        </p:nvSpPr>
+        <p:spPr>
+          <a:xfrm>
+            <a:off x="3086122" y="1383966"/>
+            <a:ext cx="5731496" cy="337596"/>
+          </a:xfrm>
+          <a:prstGeom prst="rect">
+            <a:avLst/>
+          </a:prstGeom>
+          <a:noFill/>
+          <a:ln w="12700">
+            <a:solidFill>
+              <a:schemeClr val="tx1"/>
+            </a:solidFill>
+          </a:ln>
+        </p:spPr>
+        <p:style>
+          <a:lnRef idx="2">
+            <a:schemeClr val="accent1">
+              <a:shade val="50000"/>
+            </a:schemeClr>
+          </a:lnRef>
+          <a:fillRef idx="1">
+            <a:schemeClr val="accent1"/>
+          </a:fillRef>
+          <a:effectRef idx="0">
+            <a:schemeClr val="accent1"/>
+          </a:effectRef>
+          <a:fontRef idx="minor">
+            <a:schemeClr val="lt1"/>
+          </a:fontRef>
+        </p:style>
+        <p:txBody>
+          <a:bodyPr rtlCol="0" anchor="ctr"/>
+          <a:lstStyle/>
+          <a:p>
+            <a:pPr algn="ctr"/>
+            <a:endParaRPr lang="de-CH" dirty="0"/>
+          </a:p>
+        </p:txBody>
+      </p:sp>
+      <p:sp>
+        <p:nvSpPr>
+          <p:cNvPr id="7" name="Textfeld 6">
+            <a:extLst>
+              <a:ext uri="{FF2B5EF4-FFF2-40B4-BE49-F238E27FC236}">
+                <a16:creationId xmlns:a16="http://schemas.microsoft.com/office/drawing/2014/main" id="{F2B64833-79AD-2F30-6A1E-D03FEEABB726}"/>
+              </a:ext>
+            </a:extLst>
+          </p:cNvPr>
+          <p:cNvSpPr txBox="1"/>
+          <p:nvPr/>
+        </p:nvSpPr>
+        <p:spPr>
+          <a:xfrm>
+            <a:off x="3086122" y="1429425"/>
+            <a:ext cx="2183962" cy="261610"/>
+          </a:xfrm>
+          <a:prstGeom prst="rect">
+            <a:avLst/>
+          </a:prstGeom>
+          <a:noFill/>
+        </p:spPr>
+        <p:txBody>
+          <a:bodyPr wrap="square" rtlCol="0">
+            <a:spAutoFit/>
+          </a:bodyPr>
+          <a:lstStyle/>
+          <a:p>
+            <a:r>
+              <a:rPr lang="de-CH" sz="1100" b="1"/>
+              <a:t>id_</a:t>
+            </a:r>
+            <a:r>
+              <a:rPr lang="de-CH" sz="1100" b="1" dirty="0" err="1"/>
+              <a:t>guestbook_fileupload</a:t>
+            </a:r>
+            <a:r>
+              <a:rPr lang="de-CH" sz="1100" b="1" dirty="0"/>
+              <a:t> </a:t>
             </a:r>
             <a:endParaRPr lang="de-CH" b="1" dirty="0"/>
           </a:p>

</xml_diff>

<commit_message>
Start instructions as text and not image
</commit_message>
<xml_diff>
--- a/Description/JazzGuestsUpload.pptx
+++ b/Description/JazzGuestsUpload.pptx
@@ -4058,8 +4058,8 @@
         </p:nvSpPr>
         <p:spPr>
           <a:xfrm>
-            <a:off x="1411688" y="1249342"/>
-            <a:ext cx="3817512" cy="1938992"/>
+            <a:off x="1510179" y="1224628"/>
+            <a:ext cx="3620529" cy="1938992"/>
           </a:xfrm>
           <a:prstGeom prst="rect">
             <a:avLst/>
@@ -4083,7 +4083,7 @@
                 <a:latin typeface="Arial" panose="020B0604020202020204" pitchFamily="34" charset="0"/>
                 <a:cs typeface="Arial" panose="020B0604020202020204" pitchFamily="34" charset="0"/>
               </a:rPr>
-              <a:t>Foto bitte von der gescannten Gästebuch- Zeichnung, Selfie oder ein anderes Konzert-Foto wählen </a:t>
+              <a:t>Foto von der gescannten Gästebuch-Zeichnung, Selfie oder ein anderes Konzert-Foto</a:t>
             </a:r>
           </a:p>
         </p:txBody>

</xml_diff>

<commit_message>
Global variable g_edit_record_mode replaced member
</commit_message>
<xml_diff>
--- a/Description/JazzGuestsUpload.pptx
+++ b/Description/JazzGuestsUpload.pptx
@@ -305,7 +305,7 @@
           <a:p>
             <a:fld id="{DDCE6D58-9B57-4731-A47B-3CD41B48F0A9}" type="datetimeFigureOut">
               <a:rPr lang="de-CH" smtClean="0"/>
-              <a:t>08.04.2025</a:t>
+              <a:t>09.04.2025</a:t>
             </a:fld>
             <a:endParaRPr lang="de-CH"/>
           </a:p>
@@ -475,7 +475,7 @@
           <a:p>
             <a:fld id="{DDCE6D58-9B57-4731-A47B-3CD41B48F0A9}" type="datetimeFigureOut">
               <a:rPr lang="de-CH" smtClean="0"/>
-              <a:t>08.04.2025</a:t>
+              <a:t>09.04.2025</a:t>
             </a:fld>
             <a:endParaRPr lang="de-CH"/>
           </a:p>
@@ -655,7 +655,7 @@
           <a:p>
             <a:fld id="{DDCE6D58-9B57-4731-A47B-3CD41B48F0A9}" type="datetimeFigureOut">
               <a:rPr lang="de-CH" smtClean="0"/>
-              <a:t>08.04.2025</a:t>
+              <a:t>09.04.2025</a:t>
             </a:fld>
             <a:endParaRPr lang="de-CH"/>
           </a:p>
@@ -825,7 +825,7 @@
           <a:p>
             <a:fld id="{DDCE6D58-9B57-4731-A47B-3CD41B48F0A9}" type="datetimeFigureOut">
               <a:rPr lang="de-CH" smtClean="0"/>
-              <a:t>08.04.2025</a:t>
+              <a:t>09.04.2025</a:t>
             </a:fld>
             <a:endParaRPr lang="de-CH"/>
           </a:p>
@@ -1071,7 +1071,7 @@
           <a:p>
             <a:fld id="{DDCE6D58-9B57-4731-A47B-3CD41B48F0A9}" type="datetimeFigureOut">
               <a:rPr lang="de-CH" smtClean="0"/>
-              <a:t>08.04.2025</a:t>
+              <a:t>09.04.2025</a:t>
             </a:fld>
             <a:endParaRPr lang="de-CH"/>
           </a:p>
@@ -1303,7 +1303,7 @@
           <a:p>
             <a:fld id="{DDCE6D58-9B57-4731-A47B-3CD41B48F0A9}" type="datetimeFigureOut">
               <a:rPr lang="de-CH" smtClean="0"/>
-              <a:t>08.04.2025</a:t>
+              <a:t>09.04.2025</a:t>
             </a:fld>
             <a:endParaRPr lang="de-CH"/>
           </a:p>
@@ -1670,7 +1670,7 @@
           <a:p>
             <a:fld id="{DDCE6D58-9B57-4731-A47B-3CD41B48F0A9}" type="datetimeFigureOut">
               <a:rPr lang="de-CH" smtClean="0"/>
-              <a:t>08.04.2025</a:t>
+              <a:t>09.04.2025</a:t>
             </a:fld>
             <a:endParaRPr lang="de-CH"/>
           </a:p>
@@ -1788,7 +1788,7 @@
           <a:p>
             <a:fld id="{DDCE6D58-9B57-4731-A47B-3CD41B48F0A9}" type="datetimeFigureOut">
               <a:rPr lang="de-CH" smtClean="0"/>
-              <a:t>08.04.2025</a:t>
+              <a:t>09.04.2025</a:t>
             </a:fld>
             <a:endParaRPr lang="de-CH"/>
           </a:p>
@@ -1883,7 +1883,7 @@
           <a:p>
             <a:fld id="{DDCE6D58-9B57-4731-A47B-3CD41B48F0A9}" type="datetimeFigureOut">
               <a:rPr lang="de-CH" smtClean="0"/>
-              <a:t>08.04.2025</a:t>
+              <a:t>09.04.2025</a:t>
             </a:fld>
             <a:endParaRPr lang="de-CH"/>
           </a:p>
@@ -2160,7 +2160,7 @@
           <a:p>
             <a:fld id="{DDCE6D58-9B57-4731-A47B-3CD41B48F0A9}" type="datetimeFigureOut">
               <a:rPr lang="de-CH" smtClean="0"/>
-              <a:t>08.04.2025</a:t>
+              <a:t>09.04.2025</a:t>
             </a:fld>
             <a:endParaRPr lang="de-CH"/>
           </a:p>
@@ -2413,7 +2413,7 @@
           <a:p>
             <a:fld id="{DDCE6D58-9B57-4731-A47B-3CD41B48F0A9}" type="datetimeFigureOut">
               <a:rPr lang="de-CH" smtClean="0"/>
-              <a:t>08.04.2025</a:t>
+              <a:t>09.04.2025</a:t>
             </a:fld>
             <a:endParaRPr lang="de-CH"/>
           </a:p>
@@ -2626,7 +2626,7 @@
           <a:p>
             <a:fld id="{DDCE6D58-9B57-4731-A47B-3CD41B48F0A9}" type="datetimeFigureOut">
               <a:rPr lang="de-CH" smtClean="0"/>
-              <a:t>08.04.2025</a:t>
+              <a:t>09.04.2025</a:t>
             </a:fld>
             <a:endParaRPr lang="de-CH"/>
           </a:p>
@@ -5999,7 +5999,7 @@
         <p:spPr>
           <a:xfrm>
             <a:off x="135081" y="93517"/>
-            <a:ext cx="9071264" cy="2970044"/>
+            <a:ext cx="9071264" cy="477054"/>
           </a:xfrm>
           <a:prstGeom prst="rect">
             <a:avLst/>
@@ -6026,789 +6026,71 @@
                 <a:latin typeface="Arial" panose="020B0604020202020204" pitchFamily="34" charset="0"/>
                 <a:cs typeface="Arial" panose="020B0604020202020204" pitchFamily="34" charset="0"/>
               </a:rPr>
-              <a:t> &lt;</a:t>
-            </a:r>
-            <a:r>
-              <a:rPr lang="de-CH" sz="900" b="1" dirty="0" err="1">
-                <a:latin typeface="Arial" panose="020B0604020202020204" pitchFamily="34" charset="0"/>
-                <a:cs typeface="Arial" panose="020B0604020202020204" pitchFamily="34" charset="0"/>
-              </a:rPr>
-              <a:t>JazzGuest</a:t>
-            </a:r>
-            <a:r>
-              <a:rPr lang="de-CH" sz="900" b="1" dirty="0">
-                <a:latin typeface="Arial" panose="020B0604020202020204" pitchFamily="34" charset="0"/>
-                <a:cs typeface="Arial" panose="020B0604020202020204" pitchFamily="34" charset="0"/>
-              </a:rPr>
-              <a:t>&gt;</a:t>
-            </a:r>
-          </a:p>
-          <a:p>
-            <a:r>
-              <a:rPr lang="de-CH" sz="900" b="1" dirty="0">
-                <a:latin typeface="Arial" panose="020B0604020202020204" pitchFamily="34" charset="0"/>
-                <a:cs typeface="Arial" panose="020B0604020202020204" pitchFamily="34" charset="0"/>
-              </a:rPr>
-              <a:t>        &lt;</a:t>
-            </a:r>
-            <a:r>
-              <a:rPr lang="de-CH" sz="900" b="1" dirty="0" err="1">
-                <a:latin typeface="Arial" panose="020B0604020202020204" pitchFamily="34" charset="0"/>
-                <a:cs typeface="Arial" panose="020B0604020202020204" pitchFamily="34" charset="0"/>
-              </a:rPr>
-              <a:t>JazzGuestYear</a:t>
-            </a:r>
-            <a:r>
-              <a:rPr lang="de-CH" sz="900" b="1" dirty="0">
-                <a:latin typeface="Arial" panose="020B0604020202020204" pitchFamily="34" charset="0"/>
-                <a:cs typeface="Arial" panose="020B0604020202020204" pitchFamily="34" charset="0"/>
-              </a:rPr>
-              <a:t>&gt;2025&lt;/</a:t>
-            </a:r>
-            <a:r>
-              <a:rPr lang="de-CH" sz="900" b="1" dirty="0" err="1">
-                <a:latin typeface="Arial" panose="020B0604020202020204" pitchFamily="34" charset="0"/>
-                <a:cs typeface="Arial" panose="020B0604020202020204" pitchFamily="34" charset="0"/>
-              </a:rPr>
-              <a:t>JazzGuestYear</a:t>
-            </a:r>
-            <a:r>
-              <a:rPr lang="de-CH" sz="900" b="1" dirty="0">
-                <a:latin typeface="Arial" panose="020B0604020202020204" pitchFamily="34" charset="0"/>
-                <a:cs typeface="Arial" panose="020B0604020202020204" pitchFamily="34" charset="0"/>
-              </a:rPr>
-              <a:t>&gt;</a:t>
-            </a:r>
-          </a:p>
-          <a:p>
-            <a:r>
-              <a:rPr lang="de-CH" sz="900" b="1" dirty="0">
-                <a:latin typeface="Arial" panose="020B0604020202020204" pitchFamily="34" charset="0"/>
-                <a:cs typeface="Arial" panose="020B0604020202020204" pitchFamily="34" charset="0"/>
-              </a:rPr>
-              <a:t>        &lt;</a:t>
-            </a:r>
-            <a:r>
-              <a:rPr lang="de-CH" sz="900" b="1" dirty="0" err="1">
-                <a:latin typeface="Arial" panose="020B0604020202020204" pitchFamily="34" charset="0"/>
-                <a:cs typeface="Arial" panose="020B0604020202020204" pitchFamily="34" charset="0"/>
-              </a:rPr>
-              <a:t>JazzGuestMonth</a:t>
-            </a:r>
-            <a:r>
-              <a:rPr lang="de-CH" sz="900" b="1" dirty="0">
-                <a:latin typeface="Arial" panose="020B0604020202020204" pitchFamily="34" charset="0"/>
-                <a:cs typeface="Arial" panose="020B0604020202020204" pitchFamily="34" charset="0"/>
-              </a:rPr>
-              <a:t>&gt;3&lt;/</a:t>
-            </a:r>
-            <a:r>
-              <a:rPr lang="de-CH" sz="900" b="1" dirty="0" err="1">
-                <a:latin typeface="Arial" panose="020B0604020202020204" pitchFamily="34" charset="0"/>
-                <a:cs typeface="Arial" panose="020B0604020202020204" pitchFamily="34" charset="0"/>
-              </a:rPr>
-              <a:t>JazzGuestMonth</a:t>
-            </a:r>
-            <a:r>
-              <a:rPr lang="de-CH" sz="900" b="1" dirty="0">
-                <a:latin typeface="Arial" panose="020B0604020202020204" pitchFamily="34" charset="0"/>
-                <a:cs typeface="Arial" panose="020B0604020202020204" pitchFamily="34" charset="0"/>
-              </a:rPr>
-              <a:t>&gt;</a:t>
-            </a:r>
-          </a:p>
-          <a:p>
-            <a:r>
-              <a:rPr lang="de-CH" sz="900" b="1" dirty="0">
-                <a:latin typeface="Arial" panose="020B0604020202020204" pitchFamily="34" charset="0"/>
-                <a:cs typeface="Arial" panose="020B0604020202020204" pitchFamily="34" charset="0"/>
-              </a:rPr>
-              <a:t>        &lt;</a:t>
-            </a:r>
-            <a:r>
-              <a:rPr lang="de-CH" sz="900" b="1" dirty="0" err="1">
-                <a:latin typeface="Arial" panose="020B0604020202020204" pitchFamily="34" charset="0"/>
-                <a:cs typeface="Arial" panose="020B0604020202020204" pitchFamily="34" charset="0"/>
-              </a:rPr>
-              <a:t>JazzGuestDay</a:t>
-            </a:r>
-            <a:r>
-              <a:rPr lang="de-CH" sz="900" b="1" dirty="0">
-                <a:latin typeface="Arial" panose="020B0604020202020204" pitchFamily="34" charset="0"/>
-                <a:cs typeface="Arial" panose="020B0604020202020204" pitchFamily="34" charset="0"/>
-              </a:rPr>
-              <a:t>&gt;8&lt;/</a:t>
-            </a:r>
-            <a:r>
-              <a:rPr lang="de-CH" sz="900" b="1" dirty="0" err="1">
-                <a:latin typeface="Arial" panose="020B0604020202020204" pitchFamily="34" charset="0"/>
-                <a:cs typeface="Arial" panose="020B0604020202020204" pitchFamily="34" charset="0"/>
-              </a:rPr>
-              <a:t>JazzGuestDay</a:t>
-            </a:r>
-            <a:r>
-              <a:rPr lang="de-CH" sz="900" b="1" dirty="0">
-                <a:latin typeface="Arial" panose="020B0604020202020204" pitchFamily="34" charset="0"/>
-                <a:cs typeface="Arial" panose="020B0604020202020204" pitchFamily="34" charset="0"/>
-              </a:rPr>
-              <a:t>&gt;</a:t>
-            </a:r>
-          </a:p>
-          <a:p>
-            <a:r>
-              <a:rPr lang="de-CH" sz="900" b="1" dirty="0">
-                <a:latin typeface="Arial" panose="020B0604020202020204" pitchFamily="34" charset="0"/>
-                <a:cs typeface="Arial" panose="020B0604020202020204" pitchFamily="34" charset="0"/>
-              </a:rPr>
-              <a:t>        &lt;</a:t>
-            </a:r>
-            <a:r>
-              <a:rPr lang="de-CH" sz="900" b="1" dirty="0" err="1">
-                <a:latin typeface="Arial" panose="020B0604020202020204" pitchFamily="34" charset="0"/>
-                <a:cs typeface="Arial" panose="020B0604020202020204" pitchFamily="34" charset="0"/>
-              </a:rPr>
-              <a:t>JazzGuestBand</a:t>
-            </a:r>
-            <a:r>
-              <a:rPr lang="de-CH" sz="900" b="1" dirty="0">
-                <a:latin typeface="Arial" panose="020B0604020202020204" pitchFamily="34" charset="0"/>
-                <a:cs typeface="Arial" panose="020B0604020202020204" pitchFamily="34" charset="0"/>
-              </a:rPr>
-              <a:t>&gt;</a:t>
-            </a:r>
-            <a:r>
-              <a:rPr lang="de-CH" sz="900" b="1" dirty="0" err="1">
-                <a:latin typeface="Arial" panose="020B0604020202020204" pitchFamily="34" charset="0"/>
-                <a:cs typeface="Arial" panose="020B0604020202020204" pitchFamily="34" charset="0"/>
-              </a:rPr>
-              <a:t>PrismE</a:t>
-            </a:r>
-            <a:r>
-              <a:rPr lang="de-CH" sz="900" b="1" dirty="0">
-                <a:latin typeface="Arial" panose="020B0604020202020204" pitchFamily="34" charset="0"/>
-                <a:cs typeface="Arial" panose="020B0604020202020204" pitchFamily="34" charset="0"/>
-              </a:rPr>
-              <a:t>&lt;/</a:t>
-            </a:r>
-            <a:r>
-              <a:rPr lang="de-CH" sz="900" b="1" dirty="0" err="1">
-                <a:latin typeface="Arial" panose="020B0604020202020204" pitchFamily="34" charset="0"/>
-                <a:cs typeface="Arial" panose="020B0604020202020204" pitchFamily="34" charset="0"/>
-              </a:rPr>
-              <a:t>JazzGuestBand</a:t>
-            </a:r>
-            <a:r>
-              <a:rPr lang="de-CH" sz="900" b="1" dirty="0">
-                <a:latin typeface="Arial" panose="020B0604020202020204" pitchFamily="34" charset="0"/>
-                <a:cs typeface="Arial" panose="020B0604020202020204" pitchFamily="34" charset="0"/>
-              </a:rPr>
-              <a:t>&gt;</a:t>
-            </a:r>
-          </a:p>
-          <a:p>
-            <a:r>
-              <a:rPr lang="de-CH" sz="900" b="1" dirty="0">
-                <a:latin typeface="Arial" panose="020B0604020202020204" pitchFamily="34" charset="0"/>
-                <a:cs typeface="Arial" panose="020B0604020202020204" pitchFamily="34" charset="0"/>
-              </a:rPr>
-              <a:t>        &lt;</a:t>
-            </a:r>
-            <a:r>
-              <a:rPr lang="de-CH" sz="900" b="1" dirty="0" err="1">
-                <a:latin typeface="Arial" panose="020B0604020202020204" pitchFamily="34" charset="0"/>
-                <a:cs typeface="Arial" panose="020B0604020202020204" pitchFamily="34" charset="0"/>
-              </a:rPr>
-              <a:t>JazzGuestMusicians</a:t>
-            </a:r>
-            <a:r>
-              <a:rPr lang="de-CH" sz="900" b="1" dirty="0">
-                <a:latin typeface="Arial" panose="020B0604020202020204" pitchFamily="34" charset="0"/>
-                <a:cs typeface="Arial" panose="020B0604020202020204" pitchFamily="34" charset="0"/>
-              </a:rPr>
-              <a:t>&gt;Leïla </a:t>
-            </a:r>
-            <a:r>
-              <a:rPr lang="de-CH" sz="900" b="1" dirty="0" err="1">
-                <a:latin typeface="Arial" panose="020B0604020202020204" pitchFamily="34" charset="0"/>
-                <a:cs typeface="Arial" panose="020B0604020202020204" pitchFamily="34" charset="0"/>
-              </a:rPr>
-              <a:t>Kramis</a:t>
-            </a:r>
-            <a:r>
-              <a:rPr lang="de-CH" sz="900" b="1" dirty="0">
-                <a:latin typeface="Arial" panose="020B0604020202020204" pitchFamily="34" charset="0"/>
-                <a:cs typeface="Arial" panose="020B0604020202020204" pitchFamily="34" charset="0"/>
-              </a:rPr>
-              <a:t>, Stéphane Fisch, Sylvain Fournier&lt;/</a:t>
-            </a:r>
-            <a:r>
-              <a:rPr lang="de-CH" sz="900" b="1" dirty="0" err="1">
-                <a:latin typeface="Arial" panose="020B0604020202020204" pitchFamily="34" charset="0"/>
-                <a:cs typeface="Arial" panose="020B0604020202020204" pitchFamily="34" charset="0"/>
-              </a:rPr>
-              <a:t>JazzGuestMusicians</a:t>
-            </a:r>
-            <a:r>
-              <a:rPr lang="de-CH" sz="900" b="1" dirty="0">
-                <a:latin typeface="Arial" panose="020B0604020202020204" pitchFamily="34" charset="0"/>
-                <a:cs typeface="Arial" panose="020B0604020202020204" pitchFamily="34" charset="0"/>
-              </a:rPr>
-              <a:t>&gt;</a:t>
-            </a:r>
-          </a:p>
-          <a:p>
-            <a:r>
-              <a:rPr lang="de-CH" sz="900" b="1" dirty="0">
-                <a:latin typeface="Arial" panose="020B0604020202020204" pitchFamily="34" charset="0"/>
-                <a:cs typeface="Arial" panose="020B0604020202020204" pitchFamily="34" charset="0"/>
-              </a:rPr>
-              <a:t>        &lt;</a:t>
-            </a:r>
-            <a:r>
-              <a:rPr lang="de-CH" sz="900" b="1" dirty="0" err="1">
-                <a:latin typeface="Arial" panose="020B0604020202020204" pitchFamily="34" charset="0"/>
-                <a:cs typeface="Arial" panose="020B0604020202020204" pitchFamily="34" charset="0"/>
-              </a:rPr>
-              <a:t>JazzGuestHeader</a:t>
-            </a:r>
-            <a:r>
-              <a:rPr lang="de-CH" sz="900" b="1" dirty="0">
-                <a:latin typeface="Arial" panose="020B0604020202020204" pitchFamily="34" charset="0"/>
-                <a:cs typeface="Arial" panose="020B0604020202020204" pitchFamily="34" charset="0"/>
-              </a:rPr>
-              <a:t>&gt;Freude am Zeichnen&lt;/</a:t>
-            </a:r>
-            <a:r>
-              <a:rPr lang="de-CH" sz="900" b="1" dirty="0" err="1">
-                <a:latin typeface="Arial" panose="020B0604020202020204" pitchFamily="34" charset="0"/>
-                <a:cs typeface="Arial" panose="020B0604020202020204" pitchFamily="34" charset="0"/>
-              </a:rPr>
-              <a:t>JazzGuestHeader</a:t>
-            </a:r>
-            <a:r>
-              <a:rPr lang="de-CH" sz="900" b="1" dirty="0">
-                <a:latin typeface="Arial" panose="020B0604020202020204" pitchFamily="34" charset="0"/>
-                <a:cs typeface="Arial" panose="020B0604020202020204" pitchFamily="34" charset="0"/>
-              </a:rPr>
-              <a:t>&gt;</a:t>
-            </a:r>
-          </a:p>
-          <a:p>
-            <a:r>
-              <a:rPr lang="de-CH" sz="900" b="1" dirty="0">
-                <a:latin typeface="Arial" panose="020B0604020202020204" pitchFamily="34" charset="0"/>
-                <a:cs typeface="Arial" panose="020B0604020202020204" pitchFamily="34" charset="0"/>
-              </a:rPr>
-              <a:t>        &lt;</a:t>
-            </a:r>
-            <a:r>
-              <a:rPr lang="de-CH" sz="900" b="1" dirty="0" err="1">
-                <a:latin typeface="Arial" panose="020B0604020202020204" pitchFamily="34" charset="0"/>
-                <a:cs typeface="Arial" panose="020B0604020202020204" pitchFamily="34" charset="0"/>
-              </a:rPr>
-              <a:t>JazzGuestText</a:t>
-            </a:r>
-            <a:r>
-              <a:rPr lang="de-CH" sz="900" b="1" dirty="0">
-                <a:latin typeface="Arial" panose="020B0604020202020204" pitchFamily="34" charset="0"/>
-                <a:cs typeface="Arial" panose="020B0604020202020204" pitchFamily="34" charset="0"/>
-              </a:rPr>
-              <a:t>&gt;Sylvain Fournier nach dem </a:t>
-            </a:r>
-            <a:r>
-              <a:rPr lang="de-CH" sz="900" b="1" dirty="0" err="1">
-                <a:latin typeface="Arial" panose="020B0604020202020204" pitchFamily="34" charset="0"/>
-                <a:cs typeface="Arial" panose="020B0604020202020204" pitchFamily="34" charset="0"/>
-              </a:rPr>
-              <a:t>PrismE</a:t>
-            </a:r>
-            <a:r>
-              <a:rPr lang="de-CH" sz="900" b="1" dirty="0">
-                <a:latin typeface="Arial" panose="020B0604020202020204" pitchFamily="34" charset="0"/>
-                <a:cs typeface="Arial" panose="020B0604020202020204" pitchFamily="34" charset="0"/>
-              </a:rPr>
-              <a:t> Konzert. Bildkünstle …&lt;/</a:t>
-            </a:r>
-            <a:r>
-              <a:rPr lang="de-CH" sz="900" b="1" dirty="0" err="1">
-                <a:latin typeface="Arial" panose="020B0604020202020204" pitchFamily="34" charset="0"/>
-                <a:cs typeface="Arial" panose="020B0604020202020204" pitchFamily="34" charset="0"/>
-              </a:rPr>
-              <a:t>JazzGuestText</a:t>
-            </a:r>
-            <a:r>
-              <a:rPr lang="de-CH" sz="900" b="1" dirty="0">
-                <a:latin typeface="Arial" panose="020B0604020202020204" pitchFamily="34" charset="0"/>
-                <a:cs typeface="Arial" panose="020B0604020202020204" pitchFamily="34" charset="0"/>
-              </a:rPr>
-              <a:t>&gt;</a:t>
-            </a:r>
-          </a:p>
-          <a:p>
-            <a:r>
-              <a:rPr lang="de-CH" sz="900" b="1" dirty="0">
-                <a:latin typeface="Arial" panose="020B0604020202020204" pitchFamily="34" charset="0"/>
-                <a:cs typeface="Arial" panose="020B0604020202020204" pitchFamily="34" charset="0"/>
-              </a:rPr>
-              <a:t>        &lt;</a:t>
-            </a:r>
-            <a:r>
-              <a:rPr lang="de-CH" sz="900" b="1" dirty="0" err="1">
-                <a:latin typeface="Arial" panose="020B0604020202020204" pitchFamily="34" charset="0"/>
-                <a:cs typeface="Arial" panose="020B0604020202020204" pitchFamily="34" charset="0"/>
-              </a:rPr>
-              <a:t>JazzGuestNames</a:t>
-            </a:r>
-            <a:r>
-              <a:rPr lang="de-CH" sz="900" b="1" dirty="0">
-                <a:latin typeface="Arial" panose="020B0604020202020204" pitchFamily="34" charset="0"/>
-                <a:cs typeface="Arial" panose="020B0604020202020204" pitchFamily="34" charset="0"/>
-              </a:rPr>
-              <a:t>&gt;Gunnar Liden&lt;/</a:t>
-            </a:r>
-            <a:r>
-              <a:rPr lang="de-CH" sz="900" b="1" dirty="0" err="1">
-                <a:latin typeface="Arial" panose="020B0604020202020204" pitchFamily="34" charset="0"/>
-                <a:cs typeface="Arial" panose="020B0604020202020204" pitchFamily="34" charset="0"/>
-              </a:rPr>
-              <a:t>JazzGuestNames</a:t>
-            </a:r>
-            <a:r>
-              <a:rPr lang="de-CH" sz="900" b="1" dirty="0">
-                <a:latin typeface="Arial" panose="020B0604020202020204" pitchFamily="34" charset="0"/>
-                <a:cs typeface="Arial" panose="020B0604020202020204" pitchFamily="34" charset="0"/>
-              </a:rPr>
-              <a:t>&gt;</a:t>
-            </a:r>
-          </a:p>
-          <a:p>
-            <a:r>
-              <a:rPr lang="de-CH" sz="900" b="1" dirty="0">
-                <a:latin typeface="Arial" panose="020B0604020202020204" pitchFamily="34" charset="0"/>
-                <a:cs typeface="Arial" panose="020B0604020202020204" pitchFamily="34" charset="0"/>
-              </a:rPr>
-              <a:t>        &lt;</a:t>
-            </a:r>
-            <a:r>
-              <a:rPr lang="de-CH" sz="900" b="1" dirty="0" err="1">
-                <a:latin typeface="Arial" panose="020B0604020202020204" pitchFamily="34" charset="0"/>
-                <a:cs typeface="Arial" panose="020B0604020202020204" pitchFamily="34" charset="0"/>
-              </a:rPr>
-              <a:t>JazzGuestRemark</a:t>
-            </a:r>
-            <a:r>
-              <a:rPr lang="de-CH" sz="900" b="1" dirty="0">
-                <a:latin typeface="Arial" panose="020B0604020202020204" pitchFamily="34" charset="0"/>
-                <a:cs typeface="Arial" panose="020B0604020202020204" pitchFamily="34" charset="0"/>
-              </a:rPr>
-              <a:t>&gt;</a:t>
-            </a:r>
-            <a:r>
-              <a:rPr lang="de-CH" sz="900" b="1" dirty="0" err="1">
-                <a:latin typeface="Arial" panose="020B0604020202020204" pitchFamily="34" charset="0"/>
-                <a:cs typeface="Arial" panose="020B0604020202020204" pitchFamily="34" charset="0"/>
-              </a:rPr>
-              <a:t>NotYetSetNodeValue</a:t>
-            </a:r>
-            <a:r>
-              <a:rPr lang="de-CH" sz="900" b="1" dirty="0">
-                <a:latin typeface="Arial" panose="020B0604020202020204" pitchFamily="34" charset="0"/>
-                <a:cs typeface="Arial" panose="020B0604020202020204" pitchFamily="34" charset="0"/>
-              </a:rPr>
-              <a:t>&lt;/</a:t>
-            </a:r>
-            <a:r>
-              <a:rPr lang="de-CH" sz="900" b="1" dirty="0" err="1">
-                <a:latin typeface="Arial" panose="020B0604020202020204" pitchFamily="34" charset="0"/>
-                <a:cs typeface="Arial" panose="020B0604020202020204" pitchFamily="34" charset="0"/>
-              </a:rPr>
-              <a:t>JazzGuestRemark</a:t>
-            </a:r>
-            <a:r>
-              <a:rPr lang="de-CH" sz="900" b="1" dirty="0">
-                <a:latin typeface="Arial" panose="020B0604020202020204" pitchFamily="34" charset="0"/>
-                <a:cs typeface="Arial" panose="020B0604020202020204" pitchFamily="34" charset="0"/>
-              </a:rPr>
-              <a:t>&gt;</a:t>
-            </a:r>
-          </a:p>
-          <a:p>
-            <a:r>
-              <a:rPr lang="de-CH" sz="900" b="1" dirty="0">
-                <a:latin typeface="Arial" panose="020B0604020202020204" pitchFamily="34" charset="0"/>
-                <a:cs typeface="Arial" panose="020B0604020202020204" pitchFamily="34" charset="0"/>
-              </a:rPr>
-              <a:t>        &lt;</a:t>
-            </a:r>
-            <a:r>
-              <a:rPr lang="de-CH" sz="900" b="1" dirty="0" err="1">
-                <a:latin typeface="Arial" panose="020B0604020202020204" pitchFamily="34" charset="0"/>
-                <a:cs typeface="Arial" panose="020B0604020202020204" pitchFamily="34" charset="0"/>
-              </a:rPr>
-              <a:t>JazzGuestFileName</a:t>
-            </a:r>
-            <a:r>
-              <a:rPr lang="de-CH" sz="900" b="1" dirty="0">
-                <a:latin typeface="Arial" panose="020B0604020202020204" pitchFamily="34" charset="0"/>
-                <a:cs typeface="Arial" panose="020B0604020202020204" pitchFamily="34" charset="0"/>
-              </a:rPr>
-              <a:t>&gt;</a:t>
-            </a:r>
-            <a:r>
-              <a:rPr lang="de-CH" sz="900" b="1" dirty="0" err="1">
-                <a:latin typeface="Arial" panose="020B0604020202020204" pitchFamily="34" charset="0"/>
-                <a:cs typeface="Arial" panose="020B0604020202020204" pitchFamily="34" charset="0"/>
-              </a:rPr>
-              <a:t>JazzGuests</a:t>
-            </a:r>
-            <a:r>
-              <a:rPr lang="de-CH" sz="900" b="1" dirty="0">
-                <a:latin typeface="Arial" panose="020B0604020202020204" pitchFamily="34" charset="0"/>
-                <a:cs typeface="Arial" panose="020B0604020202020204" pitchFamily="34" charset="0"/>
-              </a:rPr>
-              <a:t>/d20250308_REG0104.jpg&lt;/</a:t>
-            </a:r>
-            <a:r>
-              <a:rPr lang="de-CH" sz="900" b="1" dirty="0" err="1">
-                <a:latin typeface="Arial" panose="020B0604020202020204" pitchFamily="34" charset="0"/>
-                <a:cs typeface="Arial" panose="020B0604020202020204" pitchFamily="34" charset="0"/>
-              </a:rPr>
-              <a:t>JazzGuestFileName</a:t>
-            </a:r>
-            <a:r>
-              <a:rPr lang="de-CH" sz="900" b="1" dirty="0">
-                <a:latin typeface="Arial" panose="020B0604020202020204" pitchFamily="34" charset="0"/>
-                <a:cs typeface="Arial" panose="020B0604020202020204" pitchFamily="34" charset="0"/>
-              </a:rPr>
-              <a:t>&gt;</a:t>
-            </a:r>
-          </a:p>
-          <a:p>
-            <a:r>
-              <a:rPr lang="de-CH" sz="900" b="1" dirty="0">
-                <a:latin typeface="Arial" panose="020B0604020202020204" pitchFamily="34" charset="0"/>
-                <a:cs typeface="Arial" panose="020B0604020202020204" pitchFamily="34" charset="0"/>
-              </a:rPr>
-              <a:t>        &lt;</a:t>
-            </a:r>
-            <a:r>
-              <a:rPr lang="de-CH" sz="900" b="1" dirty="0" err="1">
-                <a:latin typeface="Arial" panose="020B0604020202020204" pitchFamily="34" charset="0"/>
-                <a:cs typeface="Arial" panose="020B0604020202020204" pitchFamily="34" charset="0"/>
-              </a:rPr>
-              <a:t>JazzGuestFileType</a:t>
-            </a:r>
-            <a:r>
-              <a:rPr lang="de-CH" sz="900" b="1" dirty="0">
-                <a:latin typeface="Arial" panose="020B0604020202020204" pitchFamily="34" charset="0"/>
-                <a:cs typeface="Arial" panose="020B0604020202020204" pitchFamily="34" charset="0"/>
-              </a:rPr>
-              <a:t>&gt;IMG&lt;/</a:t>
-            </a:r>
-            <a:r>
-              <a:rPr lang="de-CH" sz="900" b="1" dirty="0" err="1">
-                <a:latin typeface="Arial" panose="020B0604020202020204" pitchFamily="34" charset="0"/>
-                <a:cs typeface="Arial" panose="020B0604020202020204" pitchFamily="34" charset="0"/>
-              </a:rPr>
-              <a:t>JazzGuestFileType</a:t>
-            </a:r>
-            <a:r>
-              <a:rPr lang="de-CH" sz="900" b="1" dirty="0">
-                <a:latin typeface="Arial" panose="020B0604020202020204" pitchFamily="34" charset="0"/>
-                <a:cs typeface="Arial" panose="020B0604020202020204" pitchFamily="34" charset="0"/>
-              </a:rPr>
-              <a:t>&gt;</a:t>
-            </a:r>
-          </a:p>
-          <a:p>
-            <a:r>
-              <a:rPr lang="de-CH" sz="900" b="1" dirty="0">
-                <a:latin typeface="Arial" panose="020B0604020202020204" pitchFamily="34" charset="0"/>
-                <a:cs typeface="Arial" panose="020B0604020202020204" pitchFamily="34" charset="0"/>
-              </a:rPr>
-              <a:t>        &lt;</a:t>
-            </a:r>
-            <a:r>
-              <a:rPr lang="de-CH" sz="900" b="1" dirty="0" err="1">
-                <a:latin typeface="Arial" panose="020B0604020202020204" pitchFamily="34" charset="0"/>
-                <a:cs typeface="Arial" panose="020B0604020202020204" pitchFamily="34" charset="0"/>
-              </a:rPr>
-              <a:t>JazzGuestAvatar</a:t>
-            </a:r>
-            <a:r>
-              <a:rPr lang="de-CH" sz="900" b="1" dirty="0">
-                <a:latin typeface="Arial" panose="020B0604020202020204" pitchFamily="34" charset="0"/>
-                <a:cs typeface="Arial" panose="020B0604020202020204" pitchFamily="34" charset="0"/>
-              </a:rPr>
-              <a:t>&gt;</a:t>
-            </a:r>
-            <a:r>
-              <a:rPr lang="de-CH" sz="900" b="1" dirty="0" err="1">
-                <a:latin typeface="Arial" panose="020B0604020202020204" pitchFamily="34" charset="0"/>
-                <a:cs typeface="Arial" panose="020B0604020202020204" pitchFamily="34" charset="0"/>
-              </a:rPr>
-              <a:t>NotYetSetNodeValue</a:t>
-            </a:r>
-            <a:r>
-              <a:rPr lang="de-CH" sz="900" b="1" dirty="0">
-                <a:latin typeface="Arial" panose="020B0604020202020204" pitchFamily="34" charset="0"/>
-                <a:cs typeface="Arial" panose="020B0604020202020204" pitchFamily="34" charset="0"/>
-              </a:rPr>
-              <a:t>&lt;/</a:t>
-            </a:r>
-            <a:r>
-              <a:rPr lang="de-CH" sz="900" b="1" dirty="0" err="1">
-                <a:latin typeface="Arial" panose="020B0604020202020204" pitchFamily="34" charset="0"/>
-                <a:cs typeface="Arial" panose="020B0604020202020204" pitchFamily="34" charset="0"/>
-              </a:rPr>
-              <a:t>JazzGuestAvatar</a:t>
-            </a:r>
-            <a:r>
-              <a:rPr lang="de-CH" sz="900" b="1" dirty="0">
-                <a:latin typeface="Arial" panose="020B0604020202020204" pitchFamily="34" charset="0"/>
-                <a:cs typeface="Arial" panose="020B0604020202020204" pitchFamily="34" charset="0"/>
-              </a:rPr>
-              <a:t>&gt;</a:t>
-            </a:r>
-          </a:p>
-          <a:p>
-            <a:r>
-              <a:rPr lang="de-CH" sz="900" b="1" dirty="0">
-                <a:latin typeface="Arial" panose="020B0604020202020204" pitchFamily="34" charset="0"/>
-                <a:cs typeface="Arial" panose="020B0604020202020204" pitchFamily="34" charset="0"/>
-              </a:rPr>
-              <a:t>        &lt;</a:t>
-            </a:r>
-            <a:r>
-              <a:rPr lang="de-CH" sz="900" b="1" dirty="0" err="1">
-                <a:latin typeface="Arial" panose="020B0604020202020204" pitchFamily="34" charset="0"/>
-                <a:cs typeface="Arial" panose="020B0604020202020204" pitchFamily="34" charset="0"/>
-              </a:rPr>
-              <a:t>JazzGuestEmail</a:t>
-            </a:r>
-            <a:r>
-              <a:rPr lang="de-CH" sz="900" b="1" dirty="0">
-                <a:latin typeface="Arial" panose="020B0604020202020204" pitchFamily="34" charset="0"/>
-                <a:cs typeface="Arial" panose="020B0604020202020204" pitchFamily="34" charset="0"/>
-              </a:rPr>
-              <a:t>&gt;gunnar.liden@jazzliveaarau.ch&lt;/</a:t>
-            </a:r>
-            <a:r>
-              <a:rPr lang="de-CH" sz="900" b="1" dirty="0" err="1">
-                <a:latin typeface="Arial" panose="020B0604020202020204" pitchFamily="34" charset="0"/>
-                <a:cs typeface="Arial" panose="020B0604020202020204" pitchFamily="34" charset="0"/>
-              </a:rPr>
-              <a:t>JazzGuestEmail</a:t>
-            </a:r>
-            <a:r>
-              <a:rPr lang="de-CH" sz="900" b="1" dirty="0">
-                <a:latin typeface="Arial" panose="020B0604020202020204" pitchFamily="34" charset="0"/>
-                <a:cs typeface="Arial" panose="020B0604020202020204" pitchFamily="34" charset="0"/>
-              </a:rPr>
-              <a:t>&gt;</a:t>
-            </a:r>
-          </a:p>
-          <a:p>
-            <a:r>
-              <a:rPr lang="de-CH" sz="900" b="1" dirty="0">
-                <a:latin typeface="Arial" panose="020B0604020202020204" pitchFamily="34" charset="0"/>
-                <a:cs typeface="Arial" panose="020B0604020202020204" pitchFamily="34" charset="0"/>
-              </a:rPr>
-              <a:t>        &lt;</a:t>
-            </a:r>
-            <a:r>
-              <a:rPr lang="de-CH" sz="900" b="1" dirty="0" err="1">
-                <a:latin typeface="Arial" panose="020B0604020202020204" pitchFamily="34" charset="0"/>
-                <a:cs typeface="Arial" panose="020B0604020202020204" pitchFamily="34" charset="0"/>
-              </a:rPr>
-              <a:t>JazzGuestTelephone</a:t>
-            </a:r>
-            <a:r>
-              <a:rPr lang="de-CH" sz="900" b="1" dirty="0">
-                <a:latin typeface="Arial" panose="020B0604020202020204" pitchFamily="34" charset="0"/>
-                <a:cs typeface="Arial" panose="020B0604020202020204" pitchFamily="34" charset="0"/>
-              </a:rPr>
-              <a:t>&gt;</a:t>
-            </a:r>
-            <a:r>
-              <a:rPr lang="de-CH" sz="900" b="1" dirty="0" err="1">
-                <a:latin typeface="Arial" panose="020B0604020202020204" pitchFamily="34" charset="0"/>
-                <a:cs typeface="Arial" panose="020B0604020202020204" pitchFamily="34" charset="0"/>
-              </a:rPr>
-              <a:t>NotYetSetNodeValue</a:t>
-            </a:r>
-            <a:r>
-              <a:rPr lang="de-CH" sz="900" b="1" dirty="0">
-                <a:latin typeface="Arial" panose="020B0604020202020204" pitchFamily="34" charset="0"/>
-                <a:cs typeface="Arial" panose="020B0604020202020204" pitchFamily="34" charset="0"/>
-              </a:rPr>
-              <a:t>&lt;/</a:t>
-            </a:r>
-            <a:r>
-              <a:rPr lang="de-CH" sz="900" b="1" dirty="0" err="1">
-                <a:latin typeface="Arial" panose="020B0604020202020204" pitchFamily="34" charset="0"/>
-                <a:cs typeface="Arial" panose="020B0604020202020204" pitchFamily="34" charset="0"/>
-              </a:rPr>
-              <a:t>JazzGuestTelephone</a:t>
-            </a:r>
-            <a:r>
-              <a:rPr lang="de-CH" sz="900" b="1" dirty="0">
-                <a:latin typeface="Arial" panose="020B0604020202020204" pitchFamily="34" charset="0"/>
-                <a:cs typeface="Arial" panose="020B0604020202020204" pitchFamily="34" charset="0"/>
-              </a:rPr>
-              <a:t>&gt;</a:t>
-            </a:r>
-          </a:p>
-          <a:p>
-            <a:r>
-              <a:rPr lang="de-CH" sz="900" b="1" dirty="0">
-                <a:latin typeface="Arial" panose="020B0604020202020204" pitchFamily="34" charset="0"/>
-                <a:cs typeface="Arial" panose="020B0604020202020204" pitchFamily="34" charset="0"/>
-              </a:rPr>
-              <a:t>        &lt;</a:t>
-            </a:r>
-            <a:r>
-              <a:rPr lang="de-CH" sz="900" b="1" dirty="0" err="1">
-                <a:latin typeface="Arial" panose="020B0604020202020204" pitchFamily="34" charset="0"/>
-                <a:cs typeface="Arial" panose="020B0604020202020204" pitchFamily="34" charset="0"/>
-              </a:rPr>
-              <a:t>JazzGuestStatus</a:t>
-            </a:r>
-            <a:r>
-              <a:rPr lang="de-CH" sz="900" b="1" dirty="0">
-                <a:latin typeface="Arial" panose="020B0604020202020204" pitchFamily="34" charset="0"/>
-                <a:cs typeface="Arial" panose="020B0604020202020204" pitchFamily="34" charset="0"/>
-              </a:rPr>
-              <a:t>&gt;</a:t>
-            </a:r>
-            <a:r>
-              <a:rPr lang="de-CH" sz="900" b="1" dirty="0" err="1">
-                <a:latin typeface="Arial" panose="020B0604020202020204" pitchFamily="34" charset="0"/>
-                <a:cs typeface="Arial" panose="020B0604020202020204" pitchFamily="34" charset="0"/>
-              </a:rPr>
-              <a:t>AddedOrCheckedRecordByAdmin</a:t>
-            </a:r>
-            <a:r>
-              <a:rPr lang="de-CH" sz="900" b="1" dirty="0">
-                <a:latin typeface="Arial" panose="020B0604020202020204" pitchFamily="34" charset="0"/>
-                <a:cs typeface="Arial" panose="020B0604020202020204" pitchFamily="34" charset="0"/>
-              </a:rPr>
-              <a:t>&lt;/</a:t>
-            </a:r>
-            <a:r>
-              <a:rPr lang="de-CH" sz="900" b="1" dirty="0" err="1">
-                <a:latin typeface="Arial" panose="020B0604020202020204" pitchFamily="34" charset="0"/>
-                <a:cs typeface="Arial" panose="020B0604020202020204" pitchFamily="34" charset="0"/>
-              </a:rPr>
-              <a:t>JazzGuestStatus</a:t>
-            </a:r>
-            <a:r>
-              <a:rPr lang="de-CH" sz="900" b="1" dirty="0">
-                <a:latin typeface="Arial" panose="020B0604020202020204" pitchFamily="34" charset="0"/>
-                <a:cs typeface="Arial" panose="020B0604020202020204" pitchFamily="34" charset="0"/>
-              </a:rPr>
-              <a:t>&gt;</a:t>
-            </a:r>
-          </a:p>
-          <a:p>
-            <a:r>
-              <a:rPr lang="de-CH" sz="900" b="1" dirty="0">
-                <a:latin typeface="Arial" panose="020B0604020202020204" pitchFamily="34" charset="0"/>
-                <a:cs typeface="Arial" panose="020B0604020202020204" pitchFamily="34" charset="0"/>
-              </a:rPr>
-              <a:t>        &lt;</a:t>
-            </a:r>
-            <a:r>
-              <a:rPr lang="de-CH" sz="900" b="1" dirty="0" err="1">
-                <a:latin typeface="Arial" panose="020B0604020202020204" pitchFamily="34" charset="0"/>
-                <a:cs typeface="Arial" panose="020B0604020202020204" pitchFamily="34" charset="0"/>
-              </a:rPr>
-              <a:t>JazzGuestPublish</a:t>
-            </a:r>
-            <a:r>
-              <a:rPr lang="de-CH" sz="900" b="1" dirty="0">
-                <a:latin typeface="Arial" panose="020B0604020202020204" pitchFamily="34" charset="0"/>
-                <a:cs typeface="Arial" panose="020B0604020202020204" pitchFamily="34" charset="0"/>
-              </a:rPr>
-              <a:t>&gt;TRUE&lt;/</a:t>
-            </a:r>
-            <a:r>
-              <a:rPr lang="de-CH" sz="900" b="1" dirty="0" err="1">
-                <a:latin typeface="Arial" panose="020B0604020202020204" pitchFamily="34" charset="0"/>
-                <a:cs typeface="Arial" panose="020B0604020202020204" pitchFamily="34" charset="0"/>
-              </a:rPr>
-              <a:t>JazzGuestPublish</a:t>
-            </a:r>
-            <a:r>
-              <a:rPr lang="de-CH" sz="900" b="1" dirty="0">
-                <a:latin typeface="Arial" panose="020B0604020202020204" pitchFamily="34" charset="0"/>
-                <a:cs typeface="Arial" panose="020B0604020202020204" pitchFamily="34" charset="0"/>
-              </a:rPr>
-              <a:t>&gt;</a:t>
-            </a:r>
-          </a:p>
-          <a:p>
-            <a:r>
-              <a:rPr lang="de-CH" sz="900" b="1" dirty="0">
-                <a:latin typeface="Arial" panose="020B0604020202020204" pitchFamily="34" charset="0"/>
-                <a:cs typeface="Arial" panose="020B0604020202020204" pitchFamily="34" charset="0"/>
-              </a:rPr>
-              <a:t>        &lt;</a:t>
-            </a:r>
-            <a:r>
-              <a:rPr lang="de-CH" sz="900" b="1" dirty="0" err="1">
-                <a:latin typeface="Arial" panose="020B0604020202020204" pitchFamily="34" charset="0"/>
-                <a:cs typeface="Arial" panose="020B0604020202020204" pitchFamily="34" charset="0"/>
-              </a:rPr>
-              <a:t>JazzGuestRegNumber</a:t>
-            </a:r>
-            <a:r>
-              <a:rPr lang="de-CH" sz="900" b="1" dirty="0">
-                <a:latin typeface="Arial" panose="020B0604020202020204" pitchFamily="34" charset="0"/>
-                <a:cs typeface="Arial" panose="020B0604020202020204" pitchFamily="34" charset="0"/>
-              </a:rPr>
-              <a:t>&gt;104&lt;/</a:t>
-            </a:r>
-            <a:r>
-              <a:rPr lang="de-CH" sz="900" b="1" dirty="0" err="1">
-                <a:latin typeface="Arial" panose="020B0604020202020204" pitchFamily="34" charset="0"/>
-                <a:cs typeface="Arial" panose="020B0604020202020204" pitchFamily="34" charset="0"/>
-              </a:rPr>
-              <a:t>JazzGuestRegNumber</a:t>
-            </a:r>
-            <a:r>
-              <a:rPr lang="de-CH" sz="900" b="1" dirty="0">
-                <a:latin typeface="Arial" panose="020B0604020202020204" pitchFamily="34" charset="0"/>
-                <a:cs typeface="Arial" panose="020B0604020202020204" pitchFamily="34" charset="0"/>
-              </a:rPr>
-              <a:t>&gt;</a:t>
-            </a:r>
-          </a:p>
-          <a:p>
-            <a:r>
-              <a:rPr lang="de-CH" sz="900" b="1" dirty="0">
-                <a:latin typeface="Arial" panose="020B0604020202020204" pitchFamily="34" charset="0"/>
-                <a:cs typeface="Arial" panose="020B0604020202020204" pitchFamily="34" charset="0"/>
-              </a:rPr>
-              <a:t>  &lt;/</a:t>
-            </a:r>
-            <a:r>
-              <a:rPr lang="de-CH" sz="900" b="1" dirty="0" err="1">
-                <a:latin typeface="Arial" panose="020B0604020202020204" pitchFamily="34" charset="0"/>
-                <a:cs typeface="Arial" panose="020B0604020202020204" pitchFamily="34" charset="0"/>
-              </a:rPr>
-              <a:t>JazzGuest</a:t>
-            </a:r>
-            <a:r>
-              <a:rPr lang="de-CH" sz="900" b="1" dirty="0">
-                <a:latin typeface="Arial" panose="020B0604020202020204" pitchFamily="34" charset="0"/>
-                <a:cs typeface="Arial" panose="020B0604020202020204" pitchFamily="34" charset="0"/>
-              </a:rPr>
-              <a:t>&gt;</a:t>
-            </a:r>
-          </a:p>
-        </p:txBody>
-      </p:sp>
+              <a:t> </a:t>
+            </a:r>
+          </a:p>
+        </p:txBody>
+      </p:sp>
+      <p:pic>
+        <p:nvPicPr>
+          <p:cNvPr id="3" name="Grafik 2">
+            <a:extLst>
+              <a:ext uri="{FF2B5EF4-FFF2-40B4-BE49-F238E27FC236}">
+                <a16:creationId xmlns:a16="http://schemas.microsoft.com/office/drawing/2014/main" id="{38871745-CDAC-82B9-0443-657BFEE74A00}"/>
+              </a:ext>
+            </a:extLst>
+          </p:cNvPr>
+          <p:cNvPicPr>
+            <a:picLocks noChangeAspect="1"/>
+          </p:cNvPicPr>
+          <p:nvPr/>
+        </p:nvPicPr>
+        <p:blipFill>
+          <a:blip r:embed="rId2"/>
+          <a:stretch>
+            <a:fillRect/>
+          </a:stretch>
+        </p:blipFill>
+        <p:spPr>
+          <a:xfrm>
+            <a:off x="564741" y="684750"/>
+            <a:ext cx="3986477" cy="1644274"/>
+          </a:xfrm>
+          <a:prstGeom prst="rect">
+            <a:avLst/>
+          </a:prstGeom>
+        </p:spPr>
+      </p:pic>
+      <p:pic>
+        <p:nvPicPr>
+          <p:cNvPr id="6" name="Grafik 5">
+            <a:extLst>
+              <a:ext uri="{FF2B5EF4-FFF2-40B4-BE49-F238E27FC236}">
+                <a16:creationId xmlns:a16="http://schemas.microsoft.com/office/drawing/2014/main" id="{BAC51935-C1F4-3FE2-2809-09600569EB0F}"/>
+              </a:ext>
+            </a:extLst>
+          </p:cNvPr>
+          <p:cNvPicPr>
+            <a:picLocks noChangeAspect="1"/>
+          </p:cNvPicPr>
+          <p:nvPr/>
+        </p:nvPicPr>
+        <p:blipFill>
+          <a:blip r:embed="rId3"/>
+          <a:stretch>
+            <a:fillRect/>
+          </a:stretch>
+        </p:blipFill>
+        <p:spPr>
+          <a:xfrm>
+            <a:off x="415047" y="2443203"/>
+            <a:ext cx="11361905" cy="3990476"/>
+          </a:xfrm>
+          <a:prstGeom prst="rect">
+            <a:avLst/>
+          </a:prstGeom>
+        </p:spPr>
+      </p:pic>
     </p:spTree>
     <p:extLst>
       <p:ext uri="{BB962C8B-B14F-4D97-AF65-F5344CB8AC3E}">

</xml_diff>

<commit_message>
Function user uploaded image in edit mode
</commit_message>
<xml_diff>
--- a/Description/JazzGuestsUpload.pptx
+++ b/Description/JazzGuestsUpload.pptx
@@ -305,7 +305,7 @@
           <a:p>
             <a:fld id="{DDCE6D58-9B57-4731-A47B-3CD41B48F0A9}" type="datetimeFigureOut">
               <a:rPr lang="de-CH" smtClean="0"/>
-              <a:t>09.04.2025</a:t>
+              <a:t>10.04.2025</a:t>
             </a:fld>
             <a:endParaRPr lang="de-CH"/>
           </a:p>
@@ -475,7 +475,7 @@
           <a:p>
             <a:fld id="{DDCE6D58-9B57-4731-A47B-3CD41B48F0A9}" type="datetimeFigureOut">
               <a:rPr lang="de-CH" smtClean="0"/>
-              <a:t>09.04.2025</a:t>
+              <a:t>10.04.2025</a:t>
             </a:fld>
             <a:endParaRPr lang="de-CH"/>
           </a:p>
@@ -655,7 +655,7 @@
           <a:p>
             <a:fld id="{DDCE6D58-9B57-4731-A47B-3CD41B48F0A9}" type="datetimeFigureOut">
               <a:rPr lang="de-CH" smtClean="0"/>
-              <a:t>09.04.2025</a:t>
+              <a:t>10.04.2025</a:t>
             </a:fld>
             <a:endParaRPr lang="de-CH"/>
           </a:p>
@@ -825,7 +825,7 @@
           <a:p>
             <a:fld id="{DDCE6D58-9B57-4731-A47B-3CD41B48F0A9}" type="datetimeFigureOut">
               <a:rPr lang="de-CH" smtClean="0"/>
-              <a:t>09.04.2025</a:t>
+              <a:t>10.04.2025</a:t>
             </a:fld>
             <a:endParaRPr lang="de-CH"/>
           </a:p>
@@ -1071,7 +1071,7 @@
           <a:p>
             <a:fld id="{DDCE6D58-9B57-4731-A47B-3CD41B48F0A9}" type="datetimeFigureOut">
               <a:rPr lang="de-CH" smtClean="0"/>
-              <a:t>09.04.2025</a:t>
+              <a:t>10.04.2025</a:t>
             </a:fld>
             <a:endParaRPr lang="de-CH"/>
           </a:p>
@@ -1303,7 +1303,7 @@
           <a:p>
             <a:fld id="{DDCE6D58-9B57-4731-A47B-3CD41B48F0A9}" type="datetimeFigureOut">
               <a:rPr lang="de-CH" smtClean="0"/>
-              <a:t>09.04.2025</a:t>
+              <a:t>10.04.2025</a:t>
             </a:fld>
             <a:endParaRPr lang="de-CH"/>
           </a:p>
@@ -1670,7 +1670,7 @@
           <a:p>
             <a:fld id="{DDCE6D58-9B57-4731-A47B-3CD41B48F0A9}" type="datetimeFigureOut">
               <a:rPr lang="de-CH" smtClean="0"/>
-              <a:t>09.04.2025</a:t>
+              <a:t>10.04.2025</a:t>
             </a:fld>
             <a:endParaRPr lang="de-CH"/>
           </a:p>
@@ -1788,7 +1788,7 @@
           <a:p>
             <a:fld id="{DDCE6D58-9B57-4731-A47B-3CD41B48F0A9}" type="datetimeFigureOut">
               <a:rPr lang="de-CH" smtClean="0"/>
-              <a:t>09.04.2025</a:t>
+              <a:t>10.04.2025</a:t>
             </a:fld>
             <a:endParaRPr lang="de-CH"/>
           </a:p>
@@ -1883,7 +1883,7 @@
           <a:p>
             <a:fld id="{DDCE6D58-9B57-4731-A47B-3CD41B48F0A9}" type="datetimeFigureOut">
               <a:rPr lang="de-CH" smtClean="0"/>
-              <a:t>09.04.2025</a:t>
+              <a:t>10.04.2025</a:t>
             </a:fld>
             <a:endParaRPr lang="de-CH"/>
           </a:p>
@@ -2160,7 +2160,7 @@
           <a:p>
             <a:fld id="{DDCE6D58-9B57-4731-A47B-3CD41B48F0A9}" type="datetimeFigureOut">
               <a:rPr lang="de-CH" smtClean="0"/>
-              <a:t>09.04.2025</a:t>
+              <a:t>10.04.2025</a:t>
             </a:fld>
             <a:endParaRPr lang="de-CH"/>
           </a:p>
@@ -2413,7 +2413,7 @@
           <a:p>
             <a:fld id="{DDCE6D58-9B57-4731-A47B-3CD41B48F0A9}" type="datetimeFigureOut">
               <a:rPr lang="de-CH" smtClean="0"/>
-              <a:t>09.04.2025</a:t>
+              <a:t>10.04.2025</a:t>
             </a:fld>
             <a:endParaRPr lang="de-CH"/>
           </a:p>
@@ -2626,7 +2626,7 @@
           <a:p>
             <a:fld id="{DDCE6D58-9B57-4731-A47B-3CD41B48F0A9}" type="datetimeFigureOut">
               <a:rPr lang="de-CH" smtClean="0"/>
-              <a:t>09.04.2025</a:t>
+              <a:t>10.04.2025</a:t>
             </a:fld>
             <a:endParaRPr lang="de-CH"/>
           </a:p>

</xml_diff>

<commit_message>
Edit of record implemented without notification email
</commit_message>
<xml_diff>
--- a/Description/JazzGuestsUpload.pptx
+++ b/Description/JazzGuestsUpload.pptx
@@ -305,7 +305,7 @@
           <a:p>
             <a:fld id="{DDCE6D58-9B57-4731-A47B-3CD41B48F0A9}" type="datetimeFigureOut">
               <a:rPr lang="de-CH" smtClean="0"/>
-              <a:t>10.04.2025</a:t>
+              <a:t>13.04.2025</a:t>
             </a:fld>
             <a:endParaRPr lang="de-CH"/>
           </a:p>
@@ -475,7 +475,7 @@
           <a:p>
             <a:fld id="{DDCE6D58-9B57-4731-A47B-3CD41B48F0A9}" type="datetimeFigureOut">
               <a:rPr lang="de-CH" smtClean="0"/>
-              <a:t>10.04.2025</a:t>
+              <a:t>13.04.2025</a:t>
             </a:fld>
             <a:endParaRPr lang="de-CH"/>
           </a:p>
@@ -655,7 +655,7 @@
           <a:p>
             <a:fld id="{DDCE6D58-9B57-4731-A47B-3CD41B48F0A9}" type="datetimeFigureOut">
               <a:rPr lang="de-CH" smtClean="0"/>
-              <a:t>10.04.2025</a:t>
+              <a:t>13.04.2025</a:t>
             </a:fld>
             <a:endParaRPr lang="de-CH"/>
           </a:p>
@@ -825,7 +825,7 @@
           <a:p>
             <a:fld id="{DDCE6D58-9B57-4731-A47B-3CD41B48F0A9}" type="datetimeFigureOut">
               <a:rPr lang="de-CH" smtClean="0"/>
-              <a:t>10.04.2025</a:t>
+              <a:t>13.04.2025</a:t>
             </a:fld>
             <a:endParaRPr lang="de-CH"/>
           </a:p>
@@ -1071,7 +1071,7 @@
           <a:p>
             <a:fld id="{DDCE6D58-9B57-4731-A47B-3CD41B48F0A9}" type="datetimeFigureOut">
               <a:rPr lang="de-CH" smtClean="0"/>
-              <a:t>10.04.2025</a:t>
+              <a:t>13.04.2025</a:t>
             </a:fld>
             <a:endParaRPr lang="de-CH"/>
           </a:p>
@@ -1303,7 +1303,7 @@
           <a:p>
             <a:fld id="{DDCE6D58-9B57-4731-A47B-3CD41B48F0A9}" type="datetimeFigureOut">
               <a:rPr lang="de-CH" smtClean="0"/>
-              <a:t>10.04.2025</a:t>
+              <a:t>13.04.2025</a:t>
             </a:fld>
             <a:endParaRPr lang="de-CH"/>
           </a:p>
@@ -1670,7 +1670,7 @@
           <a:p>
             <a:fld id="{DDCE6D58-9B57-4731-A47B-3CD41B48F0A9}" type="datetimeFigureOut">
               <a:rPr lang="de-CH" smtClean="0"/>
-              <a:t>10.04.2025</a:t>
+              <a:t>13.04.2025</a:t>
             </a:fld>
             <a:endParaRPr lang="de-CH"/>
           </a:p>
@@ -1788,7 +1788,7 @@
           <a:p>
             <a:fld id="{DDCE6D58-9B57-4731-A47B-3CD41B48F0A9}" type="datetimeFigureOut">
               <a:rPr lang="de-CH" smtClean="0"/>
-              <a:t>10.04.2025</a:t>
+              <a:t>13.04.2025</a:t>
             </a:fld>
             <a:endParaRPr lang="de-CH"/>
           </a:p>
@@ -1883,7 +1883,7 @@
           <a:p>
             <a:fld id="{DDCE6D58-9B57-4731-A47B-3CD41B48F0A9}" type="datetimeFigureOut">
               <a:rPr lang="de-CH" smtClean="0"/>
-              <a:t>10.04.2025</a:t>
+              <a:t>13.04.2025</a:t>
             </a:fld>
             <a:endParaRPr lang="de-CH"/>
           </a:p>
@@ -2160,7 +2160,7 @@
           <a:p>
             <a:fld id="{DDCE6D58-9B57-4731-A47B-3CD41B48F0A9}" type="datetimeFigureOut">
               <a:rPr lang="de-CH" smtClean="0"/>
-              <a:t>10.04.2025</a:t>
+              <a:t>13.04.2025</a:t>
             </a:fld>
             <a:endParaRPr lang="de-CH"/>
           </a:p>
@@ -2413,7 +2413,7 @@
           <a:p>
             <a:fld id="{DDCE6D58-9B57-4731-A47B-3CD41B48F0A9}" type="datetimeFigureOut">
               <a:rPr lang="de-CH" smtClean="0"/>
-              <a:t>10.04.2025</a:t>
+              <a:t>13.04.2025</a:t>
             </a:fld>
             <a:endParaRPr lang="de-CH"/>
           </a:p>
@@ -2626,7 +2626,7 @@
           <a:p>
             <a:fld id="{DDCE6D58-9B57-4731-A47B-3CD41B48F0A9}" type="datetimeFigureOut">
               <a:rPr lang="de-CH" smtClean="0"/>
-              <a:t>10.04.2025</a:t>
+              <a:t>13.04.2025</a:t>
             </a:fld>
             <a:endParaRPr lang="de-CH"/>
           </a:p>
@@ -29296,8 +29296,8 @@
         </p:nvSpPr>
         <p:spPr>
           <a:xfrm>
-            <a:off x="2837649" y="120642"/>
-            <a:ext cx="6374274" cy="4381022"/>
+            <a:off x="2837649" y="120641"/>
+            <a:ext cx="6374274" cy="4555267"/>
           </a:xfrm>
           <a:prstGeom prst="rect">
             <a:avLst/>
@@ -29348,7 +29348,7 @@
         </p:nvSpPr>
         <p:spPr>
           <a:xfrm>
-            <a:off x="2908863" y="613011"/>
+            <a:off x="2908863" y="571178"/>
             <a:ext cx="6374274" cy="3654191"/>
           </a:xfrm>
           <a:prstGeom prst="rect">
@@ -29457,6 +29457,25 @@
               </a:rPr>
               <a:t>UtilLock.lock</a:t>
             </a:r>
+            <a:endParaRPr lang="de-CH" sz="1400" b="1" dirty="0">
+              <a:solidFill>
+                <a:schemeClr val="tx1"/>
+              </a:solidFill>
+              <a:latin typeface="Arial" panose="020B0604020202020204" pitchFamily="34" charset="0"/>
+              <a:cs typeface="Arial" panose="020B0604020202020204" pitchFamily="34" charset="0"/>
+            </a:endParaRPr>
+          </a:p>
+          <a:p>
+            <a:r>
+              <a:rPr lang="en-US" sz="1400" b="1" dirty="0" err="1">
+                <a:solidFill>
+                  <a:schemeClr val="tx1"/>
+                </a:solidFill>
+                <a:latin typeface="Arial" panose="020B0604020202020204" pitchFamily="34" charset="0"/>
+                <a:cs typeface="Arial" panose="020B0604020202020204" pitchFamily="34" charset="0"/>
+              </a:rPr>
+              <a:t>copyNewImageFile</a:t>
+            </a:r>
             <a:endParaRPr lang="en-US" sz="1400" b="1" dirty="0">
               <a:solidFill>
                 <a:schemeClr val="tx1"/>
@@ -29467,6 +29486,35 @@
           </a:p>
           <a:p>
             <a:r>
+              <a:rPr lang="en-US" sz="1400" b="1" dirty="0">
+                <a:solidFill>
+                  <a:schemeClr val="tx1"/>
+                </a:solidFill>
+                <a:latin typeface="Arial" panose="020B0604020202020204" pitchFamily="34" charset="0"/>
+                <a:cs typeface="Arial" panose="020B0604020202020204" pitchFamily="34" charset="0"/>
+              </a:rPr>
+              <a:t>	</a:t>
+            </a:r>
+            <a:r>
+              <a:rPr lang="en-US" sz="1400" b="1" dirty="0" err="1">
+                <a:solidFill>
+                  <a:schemeClr val="tx1"/>
+                </a:solidFill>
+                <a:latin typeface="Arial" panose="020B0604020202020204" pitchFamily="34" charset="0"/>
+                <a:cs typeface="Arial" panose="020B0604020202020204" pitchFamily="34" charset="0"/>
+              </a:rPr>
+              <a:t>UtilServer.copyFileCallback</a:t>
+            </a:r>
+            <a:endParaRPr lang="en-US" sz="1400" b="1" dirty="0">
+              <a:solidFill>
+                <a:schemeClr val="tx1"/>
+              </a:solidFill>
+              <a:latin typeface="Arial" panose="020B0604020202020204" pitchFamily="34" charset="0"/>
+              <a:cs typeface="Arial" panose="020B0604020202020204" pitchFamily="34" charset="0"/>
+            </a:endParaRPr>
+          </a:p>
+          <a:p>
+            <a:r>
               <a:rPr lang="de-CH" sz="1400" b="1" dirty="0" err="1">
                 <a:solidFill>
                   <a:schemeClr val="tx1"/>
@@ -29559,25 +29607,6 @@
               </a:rPr>
               <a:t>UtilServer.copyFileCallback</a:t>
             </a:r>
-            <a:endParaRPr lang="en-US" sz="1400" b="1" dirty="0">
-              <a:solidFill>
-                <a:schemeClr val="tx1"/>
-              </a:solidFill>
-              <a:latin typeface="Arial" panose="020B0604020202020204" pitchFamily="34" charset="0"/>
-              <a:cs typeface="Arial" panose="020B0604020202020204" pitchFamily="34" charset="0"/>
-            </a:endParaRPr>
-          </a:p>
-          <a:p>
-            <a:r>
-              <a:rPr lang="de-CH" sz="1400" b="1" dirty="0" err="1">
-                <a:solidFill>
-                  <a:schemeClr val="tx1"/>
-                </a:solidFill>
-                <a:latin typeface="Arial" panose="020B0604020202020204" pitchFamily="34" charset="0"/>
-                <a:cs typeface="Arial" panose="020B0604020202020204" pitchFamily="34" charset="0"/>
-              </a:rPr>
-              <a:t>setGuestbookDataForEdit</a:t>
-            </a:r>
             <a:endParaRPr lang="de-CH" sz="1400" b="1" dirty="0">
               <a:solidFill>
                 <a:schemeClr val="tx1"/>
@@ -29588,35 +29617,6 @@
           </a:p>
           <a:p>
             <a:r>
-              <a:rPr lang="en-US" sz="1400" b="1" dirty="0">
-                <a:solidFill>
-                  <a:schemeClr val="tx1"/>
-                </a:solidFill>
-                <a:latin typeface="Arial" panose="020B0604020202020204" pitchFamily="34" charset="0"/>
-                <a:cs typeface="Arial" panose="020B0604020202020204" pitchFamily="34" charset="0"/>
-              </a:rPr>
-              <a:t>	</a:t>
-            </a:r>
-            <a:r>
-              <a:rPr lang="en-US" sz="1400" b="1" dirty="0" err="1">
-                <a:solidFill>
-                  <a:schemeClr val="tx1"/>
-                </a:solidFill>
-                <a:latin typeface="Arial" panose="020B0604020202020204" pitchFamily="34" charset="0"/>
-                <a:cs typeface="Arial" panose="020B0604020202020204" pitchFamily="34" charset="0"/>
-              </a:rPr>
-              <a:t>GuestStorage.addGuestbookDataForEdit</a:t>
-            </a:r>
-            <a:endParaRPr lang="en-US" sz="1400" b="1" dirty="0">
-              <a:solidFill>
-                <a:schemeClr val="tx1"/>
-              </a:solidFill>
-              <a:latin typeface="Arial" panose="020B0604020202020204" pitchFamily="34" charset="0"/>
-              <a:cs typeface="Arial" panose="020B0604020202020204" pitchFamily="34" charset="0"/>
-            </a:endParaRPr>
-          </a:p>
-          <a:p>
-            <a:r>
               <a:rPr lang="de-CH" sz="1400" b="1" dirty="0" err="1">
                 <a:solidFill>
                   <a:schemeClr val="tx1"/>
@@ -29713,28 +29713,6 @@
           </a:p>
           <a:p>
             <a:r>
-              <a:rPr lang="en-US" sz="1400" b="1" dirty="0">
-                <a:solidFill>
-                  <a:schemeClr val="tx1"/>
-                </a:solidFill>
-                <a:latin typeface="Arial" panose="020B0604020202020204" pitchFamily="34" charset="0"/>
-                <a:cs typeface="Arial" panose="020B0604020202020204" pitchFamily="34" charset="0"/>
-              </a:rPr>
-              <a:t>finish</a:t>
-            </a:r>
-          </a:p>
-          <a:p>
-            <a:r>
-              <a:rPr lang="de-CH" sz="1400" b="1" dirty="0">
-                <a:solidFill>
-                  <a:schemeClr val="tx1"/>
-                </a:solidFill>
-                <a:latin typeface="Arial" panose="020B0604020202020204" pitchFamily="34" charset="0"/>
-                <a:cs typeface="Arial" panose="020B0604020202020204" pitchFamily="34" charset="0"/>
-              </a:rPr>
-              <a:t>                  </a:t>
-            </a:r>
-            <a:r>
               <a:rPr lang="de-CH" sz="1400" b="1" dirty="0" err="1">
                 <a:solidFill>
                   <a:schemeClr val="tx1"/>
@@ -29742,7 +29720,7 @@
                 <a:latin typeface="Arial" panose="020B0604020202020204" pitchFamily="34" charset="0"/>
                 <a:cs typeface="Arial" panose="020B0604020202020204" pitchFamily="34" charset="0"/>
               </a:rPr>
-              <a:t>setControlsEditLastUploadedRecord</a:t>
+              <a:t>sendNotificationEmail</a:t>
             </a:r>
             <a:endParaRPr lang="de-CH" sz="1400" b="1" dirty="0">
               <a:solidFill>
@@ -29754,6 +29732,16 @@
           </a:p>
           <a:p>
             <a:r>
+              <a:rPr lang="de-CH" sz="1400" b="1" dirty="0">
+                <a:solidFill>
+                  <a:schemeClr val="tx1"/>
+                </a:solidFill>
+                <a:latin typeface="Arial" panose="020B0604020202020204" pitchFamily="34" charset="0"/>
+                <a:cs typeface="Arial" panose="020B0604020202020204" pitchFamily="34" charset="0"/>
+              </a:rPr>
+              <a:t>	</a:t>
+            </a:r>
+            <a:r>
               <a:rPr lang="de-CH" sz="1400" b="1" dirty="0" err="1">
                 <a:solidFill>
                   <a:schemeClr val="tx1"/>
@@ -29761,7 +29749,7 @@
                 <a:latin typeface="Arial" panose="020B0604020202020204" pitchFamily="34" charset="0"/>
                 <a:cs typeface="Arial" panose="020B0604020202020204" pitchFamily="34" charset="0"/>
               </a:rPr>
-              <a:t>sendNotificationEmail</a:t>
+              <a:t>UtilEmail.sendSecureCallback</a:t>
             </a:r>
             <a:endParaRPr lang="de-CH" sz="1400" b="1" dirty="0">
               <a:solidFill>
@@ -29772,6 +29760,38 @@
             </a:endParaRPr>
           </a:p>
           <a:p>
+            <a:r>
+              <a:rPr lang="en-US" sz="1400" b="1" dirty="0">
+                <a:solidFill>
+                  <a:schemeClr val="tx1"/>
+                </a:solidFill>
+                <a:latin typeface="Arial" panose="020B0604020202020204" pitchFamily="34" charset="0"/>
+                <a:cs typeface="Arial" panose="020B0604020202020204" pitchFamily="34" charset="0"/>
+              </a:rPr>
+              <a:t>finish</a:t>
+            </a:r>
+          </a:p>
+          <a:p>
+            <a:r>
+              <a:rPr lang="de-CH" sz="1400" b="1" dirty="0">
+                <a:solidFill>
+                  <a:schemeClr val="tx1"/>
+                </a:solidFill>
+                <a:latin typeface="Arial" panose="020B0604020202020204" pitchFamily="34" charset="0"/>
+                <a:cs typeface="Arial" panose="020B0604020202020204" pitchFamily="34" charset="0"/>
+              </a:rPr>
+              <a:t>                  </a:t>
+            </a:r>
+            <a:r>
+              <a:rPr lang="de-CH" sz="1400" b="1" dirty="0" err="1">
+                <a:solidFill>
+                  <a:schemeClr val="tx1"/>
+                </a:solidFill>
+                <a:latin typeface="Arial" panose="020B0604020202020204" pitchFamily="34" charset="0"/>
+                <a:cs typeface="Arial" panose="020B0604020202020204" pitchFamily="34" charset="0"/>
+              </a:rPr>
+              <a:t>GuestStorage.setGuestbookData</a:t>
+            </a:r>
             <a:endParaRPr lang="de-CH" sz="1400" b="1" dirty="0">
               <a:solidFill>
                 <a:schemeClr val="tx1"/>
@@ -29779,18 +29799,6 @@
               <a:latin typeface="Arial" panose="020B0604020202020204" pitchFamily="34" charset="0"/>
               <a:cs typeface="Arial" panose="020B0604020202020204" pitchFamily="34" charset="0"/>
             </a:endParaRPr>
-          </a:p>
-          <a:p>
-            <a:r>
-              <a:rPr lang="de-CH" sz="1400" b="1" dirty="0">
-                <a:solidFill>
-                  <a:schemeClr val="tx1"/>
-                </a:solidFill>
-                <a:latin typeface="Arial" panose="020B0604020202020204" pitchFamily="34" charset="0"/>
-                <a:cs typeface="Arial" panose="020B0604020202020204" pitchFamily="34" charset="0"/>
-              </a:rPr>
-              <a:t>Finish</a:t>
-            </a:r>
           </a:p>
           <a:p>
             <a:endParaRPr lang="de-CH" sz="1400" b="1" dirty="0">

</xml_diff>

<commit_message>
Notification email after edit of record
</commit_message>
<xml_diff>
--- a/Description/JazzGuestsUpload.pptx
+++ b/Description/JazzGuestsUpload.pptx
@@ -29742,14 +29742,14 @@
               <a:t>	</a:t>
             </a:r>
             <a:r>
-              <a:rPr lang="de-CH" sz="1400" b="1" dirty="0" err="1">
-                <a:solidFill>
-                  <a:schemeClr val="tx1"/>
-                </a:solidFill>
-                <a:latin typeface="Arial" panose="020B0604020202020204" pitchFamily="34" charset="0"/>
-                <a:cs typeface="Arial" panose="020B0604020202020204" pitchFamily="34" charset="0"/>
-              </a:rPr>
-              <a:t>UtilEmail.sendSecureCallback</a:t>
+              <a:rPr lang="de-CH" sz="1400" b="1">
+                <a:solidFill>
+                  <a:schemeClr val="tx1"/>
+                </a:solidFill>
+                <a:latin typeface="Arial" panose="020B0604020202020204" pitchFamily="34" charset="0"/>
+                <a:cs typeface="Arial" panose="020B0604020202020204" pitchFamily="34" charset="0"/>
+              </a:rPr>
+              <a:t>sendNoticationEmailToAdministrator</a:t>
             </a:r>
             <a:endParaRPr lang="de-CH" sz="1400" b="1" dirty="0">
               <a:solidFill>

</xml_diff>